<commit_message>
Update DÉTECTION SEMI-AUTOMATISÉE DES INFECTIONS POST-OPÉRATOIRES.pptx
</commit_message>
<xml_diff>
--- a/memoire/reports/DÉTECTION SEMI-AUTOMATISÉE DES INFECTIONS POST-OPÉRATOIRES.pptx
+++ b/memoire/reports/DÉTECTION SEMI-AUTOMATISÉE DES INFECTIONS POST-OPÉRATOIRES.pptx
@@ -5,7 +5,7 @@
     <p:sldMasterId id="2147483913" r:id="rId1"/>
   </p:sldMasterIdLst>
   <p:notesMasterIdLst>
-    <p:notesMasterId r:id="rId13"/>
+    <p:notesMasterId r:id="rId12"/>
   </p:notesMasterIdLst>
   <p:sldIdLst>
     <p:sldId id="256" r:id="rId2"/>
@@ -18,7 +18,6 @@
     <p:sldId id="262" r:id="rId9"/>
     <p:sldId id="263" r:id="rId10"/>
     <p:sldId id="264" r:id="rId11"/>
-    <p:sldId id="270" r:id="rId12"/>
   </p:sldIdLst>
   <p:sldSz cx="12192000" cy="6858000"/>
   <p:notesSz cx="6858000" cy="9144000"/>
@@ -22820,7 +22819,7 @@
           <a:p>
             <a:fld id="{5856F955-25EA-4F90-B99D-7BDF15AA1216}" type="datetimeFigureOut">
               <a:rPr lang="it-IT" smtClean="0"/>
-              <a:t>25/09/2023</a:t>
+              <a:t>26/09/2023</a:t>
             </a:fld>
             <a:endParaRPr lang="it-IT"/>
           </a:p>
@@ -24632,265 +24631,6 @@
             <a:endParaRPr lang="it-IT" dirty="0"/>
           </a:p>
           <a:p>
-            <a:pPr algn="l">
-              <a:buFont typeface="Arial" panose="020B0604020202020204" pitchFamily="34" charset="0"/>
-              <a:buChar char="•"/>
-            </a:pPr>
-            <a:r>
-              <a:rPr lang="it-IT" b="0" i="0" dirty="0">
-                <a:solidFill>
-                  <a:srgbClr val="CECAC3"/>
-                </a:solidFill>
-                <a:effectLst/>
-                <a:latin typeface="Söhne"/>
-              </a:rPr>
-              <a:t>Nel 2020, l'algoritmo ha identificato 652 pazienti sottoposti a chirurgia spinale.</a:t>
-            </a:r>
-          </a:p>
-          <a:p>
-            <a:pPr algn="l">
-              <a:buFont typeface="Arial" panose="020B0604020202020204" pitchFamily="34" charset="0"/>
-              <a:buChar char="•"/>
-            </a:pPr>
-            <a:r>
-              <a:rPr lang="it-IT" b="0" i="0" dirty="0">
-                <a:solidFill>
-                  <a:srgbClr val="CECAC3"/>
-                </a:solidFill>
-                <a:effectLst/>
-                <a:latin typeface="Söhne"/>
-              </a:rPr>
-              <a:t>Di questi, 79 sono stati riammessi in ospedale per infezioni postoperatorie, con una prevalenza delle SSI stimata al ~12%.</a:t>
-            </a:r>
-          </a:p>
-          <a:p>
-            <a:pPr algn="l">
-              <a:buFont typeface="Arial" panose="020B0604020202020204" pitchFamily="34" charset="0"/>
-              <a:buChar char="•"/>
-            </a:pPr>
-            <a:r>
-              <a:rPr lang="it-IT" b="0" i="0" dirty="0">
-                <a:solidFill>
-                  <a:srgbClr val="CECAC3"/>
-                </a:solidFill>
-                <a:effectLst/>
-                <a:latin typeface="Söhne"/>
-              </a:rPr>
-              <a:t>Figura: Cronologia degli interventi chirurgici e degli eventi infettivi.</a:t>
-            </a:r>
-          </a:p>
-          <a:p>
-            <a:pPr algn="l"/>
-            <a:endParaRPr lang="it-IT" b="1" i="0" dirty="0">
-              <a:effectLst/>
-              <a:latin typeface="Söhne"/>
-            </a:endParaRPr>
-          </a:p>
-          <a:p>
-            <a:pPr algn="l">
-              <a:buFont typeface="Arial" panose="020B0604020202020204" pitchFamily="34" charset="0"/>
-              <a:buChar char="•"/>
-            </a:pPr>
-            <a:r>
-              <a:rPr lang="it-IT" b="0" i="0" dirty="0">
-                <a:solidFill>
-                  <a:srgbClr val="CECAC3"/>
-                </a:solidFill>
-                <a:effectLst/>
-                <a:latin typeface="Söhne"/>
-              </a:rPr>
-              <a:t>77 delle 79 infezioni identificate soddisfano i criteri di tempo e di impianto materiale come stipulato nella definizione di SSI.</a:t>
-            </a:r>
-          </a:p>
-          <a:p>
-            <a:pPr algn="l">
-              <a:buFont typeface="Arial" panose="020B0604020202020204" pitchFamily="34" charset="0"/>
-              <a:buChar char="•"/>
-            </a:pPr>
-            <a:r>
-              <a:rPr lang="it-IT" b="0" i="0" dirty="0">
-                <a:solidFill>
-                  <a:srgbClr val="CECAC3"/>
-                </a:solidFill>
-                <a:effectLst/>
-                <a:latin typeface="Söhne"/>
-              </a:rPr>
-              <a:t>Le infezioni si sono manifestate in media dopo un ritardo di 19,1 giorni.</a:t>
-            </a:r>
-          </a:p>
-          <a:p>
-            <a:pPr algn="l">
-              <a:buFont typeface="Arial" panose="020B0604020202020204" pitchFamily="34" charset="0"/>
-              <a:buChar char="•"/>
-            </a:pPr>
-            <a:r>
-              <a:rPr lang="it-IT" b="0" i="0" dirty="0">
-                <a:solidFill>
-                  <a:srgbClr val="CECAC3"/>
-                </a:solidFill>
-                <a:effectLst/>
-                <a:latin typeface="Söhne"/>
-              </a:rPr>
-              <a:t>Tabella: Misure di dispersione sull'insorgenza dell'infezione.</a:t>
-            </a:r>
-          </a:p>
-          <a:p>
-            <a:pPr algn="l"/>
-            <a:endParaRPr lang="it-IT" b="1" i="0" dirty="0">
-              <a:effectLst/>
-              <a:latin typeface="Söhne"/>
-            </a:endParaRPr>
-          </a:p>
-          <a:p>
-            <a:pPr algn="l">
-              <a:buFont typeface="Arial" panose="020B0604020202020204" pitchFamily="34" charset="0"/>
-              <a:buChar char="•"/>
-            </a:pPr>
-            <a:r>
-              <a:rPr lang="it-IT" b="0" i="0" dirty="0">
-                <a:solidFill>
-                  <a:srgbClr val="CECAC3"/>
-                </a:solidFill>
-                <a:effectLst/>
-                <a:latin typeface="Söhne"/>
-              </a:rPr>
-              <a:t>Un campione rappresentativo di 300 casi è stato selezionato per la revisione manuale.</a:t>
-            </a:r>
-          </a:p>
-          <a:p>
-            <a:pPr algn="l">
-              <a:buFont typeface="Arial" panose="020B0604020202020204" pitchFamily="34" charset="0"/>
-              <a:buChar char="•"/>
-            </a:pPr>
-            <a:r>
-              <a:rPr lang="it-IT" b="0" i="0" dirty="0">
-                <a:solidFill>
-                  <a:srgbClr val="CECAC3"/>
-                </a:solidFill>
-                <a:effectLst/>
-                <a:latin typeface="Söhne"/>
-              </a:rPr>
-              <a:t>Tabella: Risultati della classificazione.</a:t>
-            </a:r>
-          </a:p>
-          <a:p>
-            <a:pPr algn="l">
-              <a:buFont typeface="Arial" panose="020B0604020202020204" pitchFamily="34" charset="0"/>
-              <a:buChar char="•"/>
-            </a:pPr>
-            <a:r>
-              <a:rPr lang="it-IT" b="0" i="0" dirty="0">
-                <a:solidFill>
-                  <a:srgbClr val="CECAC3"/>
-                </a:solidFill>
-                <a:effectLst/>
-                <a:latin typeface="Söhne"/>
-              </a:rPr>
-              <a:t>Tabella: Metriche di valutazione (Sensibilità, Specificità, F1-score, ecc.)</a:t>
-            </a:r>
-          </a:p>
-          <a:p>
-            <a:pPr algn="l">
-              <a:buFont typeface="Arial" panose="020B0604020202020204" pitchFamily="34" charset="0"/>
-              <a:buChar char="•"/>
-            </a:pPr>
-            <a:endParaRPr lang="it-IT" b="0" i="0" dirty="0">
-              <a:solidFill>
-                <a:srgbClr val="CECAC3"/>
-              </a:solidFill>
-              <a:effectLst/>
-              <a:latin typeface="Söhne"/>
-            </a:endParaRPr>
-          </a:p>
-          <a:p>
-            <a:pPr algn="l">
-              <a:buFont typeface="Arial" panose="020B0604020202020204" pitchFamily="34" charset="0"/>
-              <a:buChar char="•"/>
-            </a:pPr>
-            <a:r>
-              <a:rPr lang="it-IT" b="0" i="0" dirty="0">
-                <a:solidFill>
-                  <a:srgbClr val="CECAC3"/>
-                </a:solidFill>
-                <a:effectLst/>
-                <a:latin typeface="Söhne"/>
-              </a:rPr>
-              <a:t>Tempo medio per caso tramite </a:t>
-            </a:r>
-            <a:r>
-              <a:rPr lang="it-IT" b="0" i="0" dirty="0" err="1">
-                <a:solidFill>
-                  <a:srgbClr val="CECAC3"/>
-                </a:solidFill>
-                <a:effectLst/>
-                <a:latin typeface="Söhne"/>
-              </a:rPr>
-              <a:t>EDSaN</a:t>
-            </a:r>
-            <a:r>
-              <a:rPr lang="it-IT" b="0" i="0" dirty="0">
-                <a:solidFill>
-                  <a:srgbClr val="CECAC3"/>
-                </a:solidFill>
-                <a:effectLst/>
-                <a:latin typeface="Söhne"/>
-              </a:rPr>
-              <a:t> </a:t>
-            </a:r>
-            <a:r>
-              <a:rPr lang="it-IT" b="0" i="0" dirty="0" err="1">
-                <a:solidFill>
-                  <a:srgbClr val="CECAC3"/>
-                </a:solidFill>
-                <a:effectLst/>
-                <a:latin typeface="Söhne"/>
-              </a:rPr>
-              <a:t>Consult</a:t>
-            </a:r>
-            <a:r>
-              <a:rPr lang="it-IT" b="0" i="0" dirty="0">
-                <a:solidFill>
-                  <a:srgbClr val="CECAC3"/>
-                </a:solidFill>
-                <a:effectLst/>
-                <a:latin typeface="Söhne"/>
-              </a:rPr>
-              <a:t>: 5,75 minuti.</a:t>
-            </a:r>
-          </a:p>
-          <a:p>
-            <a:pPr algn="l">
-              <a:buFont typeface="Arial" panose="020B0604020202020204" pitchFamily="34" charset="0"/>
-              <a:buChar char="•"/>
-            </a:pPr>
-            <a:r>
-              <a:rPr lang="it-IT" b="0" i="0" dirty="0">
-                <a:solidFill>
-                  <a:srgbClr val="CECAC3"/>
-                </a:solidFill>
-                <a:effectLst/>
-                <a:latin typeface="Söhne"/>
-              </a:rPr>
-              <a:t>Risparmio di tempo potenziale: circa 6.811 minuti all'anno.</a:t>
-            </a:r>
-          </a:p>
-          <a:p>
-            <a:pPr algn="l">
-              <a:buFont typeface="Arial" panose="020B0604020202020204" pitchFamily="34" charset="0"/>
-              <a:buChar char="•"/>
-            </a:pPr>
-            <a:r>
-              <a:rPr lang="it-IT" b="0" i="0" dirty="0">
-                <a:solidFill>
-                  <a:srgbClr val="CECAC3"/>
-                </a:solidFill>
-                <a:effectLst/>
-                <a:latin typeface="Söhne"/>
-              </a:rPr>
-              <a:t>Risparmio finanziario stimato: circa €2.090 all'anno per infermiere.</a:t>
-            </a:r>
-          </a:p>
-          <a:p>
             <a:endParaRPr lang="it-IT" dirty="0"/>
           </a:p>
         </p:txBody>
@@ -24981,7 +24721,7 @@
                 <a:effectLst/>
                 <a:latin typeface="Söhne"/>
               </a:rPr>
-              <a:t>Diapositive : Limitations et Défis</a:t>
+              <a:t>Diapositive : Interprétation des Résultats</a:t>
             </a:r>
           </a:p>
           <a:p>
@@ -24997,7 +24737,7 @@
                 <a:effectLst/>
                 <a:latin typeface="Söhne"/>
               </a:rPr>
-              <a:t>Sensibilité plus faible due à des notes cliniques vagues et à une réticence à documenter les complications.</a:t>
+              <a:t>L'algorithme présente un bon équilibre entre sensibilité et spécificité, suggérant une application robuste et fiable pour le suivi des SSI.</a:t>
             </a:r>
           </a:p>
           <a:p>
@@ -25013,7 +24753,7 @@
                 <a:effectLst/>
                 <a:latin typeface="Söhne"/>
               </a:rPr>
-              <a:t>Absence d’un gold standard.</a:t>
+              <a:t>Les gains d'efficacité en temps et en coûts sont substantiels, ce qui permet une meilleure allocation des ressources humaines.</a:t>
             </a:r>
           </a:p>
           <a:p>
@@ -25029,7 +24769,7 @@
                 <a:effectLst/>
                 <a:latin typeface="Söhne"/>
               </a:rPr>
-              <a:t>"</a:t>
+              <a:t> L’</a:t>
             </a:r>
             <a:r>
               <a:rPr lang="fr-FR" b="0" i="0" u="sng" dirty="0" err="1">
@@ -25039,7 +24779,7 @@
                 <a:effectLst/>
                 <a:latin typeface="Söhne"/>
               </a:rPr>
-              <a:t>Unknown</a:t>
+              <a:t>algoritmo</a:t>
             </a:r>
             <a:r>
               <a:rPr lang="fr-FR" b="0" i="0" u="sng" dirty="0">
@@ -25059,7 +24799,7 @@
                 <a:effectLst/>
                 <a:latin typeface="Söhne"/>
               </a:rPr>
-              <a:t>Unknowns</a:t>
+              <a:t>estende</a:t>
             </a:r>
             <a:r>
               <a:rPr lang="fr-FR" b="0" i="0" u="sng" dirty="0">
@@ -25069,14 +24809,318 @@
                 <a:effectLst/>
                 <a:latin typeface="Söhne"/>
               </a:rPr>
-              <a:t>" : si les patients ne reviennent pas à l'hôpital, les cas ne seront jamais capturés</a:t>
-            </a:r>
-          </a:p>
-          <a:p>
-            <a:pPr algn="l">
-              <a:buFont typeface="Arial" panose="020B0604020202020204" pitchFamily="34" charset="0"/>
-              <a:buChar char="•"/>
-            </a:pPr>
+              <a:t> la </a:t>
+            </a:r>
+            <a:r>
+              <a:rPr lang="fr-FR" b="0" i="0" u="sng" dirty="0" err="1">
+                <a:solidFill>
+                  <a:srgbClr val="CECAC3"/>
+                </a:solidFill>
+                <a:effectLst/>
+                <a:latin typeface="Söhne"/>
+              </a:rPr>
+              <a:t>sorveglianza</a:t>
+            </a:r>
+            <a:r>
+              <a:rPr lang="fr-FR" b="0" i="0" u="sng" dirty="0">
+                <a:solidFill>
+                  <a:srgbClr val="CECAC3"/>
+                </a:solidFill>
+                <a:effectLst/>
+                <a:latin typeface="Söhne"/>
+              </a:rPr>
+              <a:t> a tutti i </a:t>
+            </a:r>
+            <a:r>
+              <a:rPr lang="fr-FR" b="0" i="0" u="sng" dirty="0" err="1">
+                <a:solidFill>
+                  <a:srgbClr val="CECAC3"/>
+                </a:solidFill>
+                <a:effectLst/>
+                <a:latin typeface="Söhne"/>
+              </a:rPr>
+              <a:t>servizi</a:t>
+            </a:r>
+            <a:r>
+              <a:rPr lang="fr-FR" b="0" i="0" u="sng" dirty="0">
+                <a:solidFill>
+                  <a:srgbClr val="CECAC3"/>
+                </a:solidFill>
+                <a:effectLst/>
+                <a:latin typeface="Söhne"/>
+              </a:rPr>
+              <a:t> </a:t>
+            </a:r>
+            <a:r>
+              <a:rPr lang="fr-FR" b="0" i="0" u="sng" dirty="0" err="1">
+                <a:solidFill>
+                  <a:srgbClr val="CECAC3"/>
+                </a:solidFill>
+                <a:effectLst/>
+                <a:latin typeface="Söhne"/>
+              </a:rPr>
+              <a:t>mentre</a:t>
+            </a:r>
+            <a:r>
+              <a:rPr lang="fr-FR" b="0" i="0" u="sng" dirty="0">
+                <a:solidFill>
+                  <a:srgbClr val="CECAC3"/>
+                </a:solidFill>
+                <a:effectLst/>
+                <a:latin typeface="Söhne"/>
+              </a:rPr>
+              <a:t> </a:t>
+            </a:r>
+            <a:r>
+              <a:rPr lang="fr-FR" b="0" i="0" u="sng" dirty="0" err="1">
+                <a:solidFill>
+                  <a:srgbClr val="CECAC3"/>
+                </a:solidFill>
+                <a:effectLst/>
+                <a:latin typeface="Söhne"/>
+              </a:rPr>
+              <a:t>adesso</a:t>
+            </a:r>
+            <a:r>
+              <a:rPr lang="fr-FR" b="0" i="0" u="sng" dirty="0">
+                <a:solidFill>
+                  <a:srgbClr val="CECAC3"/>
+                </a:solidFill>
+                <a:effectLst/>
+                <a:latin typeface="Söhne"/>
+              </a:rPr>
+              <a:t> solo </a:t>
+            </a:r>
+            <a:r>
+              <a:rPr lang="fr-FR" b="0" i="0" u="sng" dirty="0" err="1">
+                <a:solidFill>
+                  <a:srgbClr val="CECAC3"/>
+                </a:solidFill>
+                <a:effectLst/>
+                <a:latin typeface="Söhne"/>
+              </a:rPr>
+              <a:t>ortopedia</a:t>
+            </a:r>
+            <a:r>
+              <a:rPr lang="fr-FR" b="0" i="0" u="sng" dirty="0">
+                <a:solidFill>
+                  <a:srgbClr val="CECAC3"/>
+                </a:solidFill>
+                <a:effectLst/>
+                <a:latin typeface="Söhne"/>
+              </a:rPr>
+              <a:t> e </a:t>
+            </a:r>
+            <a:r>
+              <a:rPr lang="fr-FR" b="0" i="0" u="sng" dirty="0" err="1">
+                <a:solidFill>
+                  <a:srgbClr val="CECAC3"/>
+                </a:solidFill>
+                <a:effectLst/>
+                <a:latin typeface="Söhne"/>
+              </a:rPr>
+              <a:t>neurologia</a:t>
+            </a:r>
+            <a:r>
+              <a:rPr lang="fr-FR" b="0" i="0" u="sng" dirty="0">
+                <a:solidFill>
+                  <a:srgbClr val="CECAC3"/>
+                </a:solidFill>
+                <a:effectLst/>
+                <a:latin typeface="Söhne"/>
+              </a:rPr>
+              <a:t> sono </a:t>
+            </a:r>
+            <a:r>
+              <a:rPr lang="fr-FR" b="0" i="0" u="sng" dirty="0" err="1">
+                <a:solidFill>
+                  <a:srgbClr val="CECAC3"/>
+                </a:solidFill>
+                <a:effectLst/>
+                <a:latin typeface="Söhne"/>
+              </a:rPr>
+              <a:t>sorvegliati</a:t>
+            </a:r>
+            <a:r>
+              <a:rPr lang="fr-FR" b="0" i="0" u="sng" dirty="0">
+                <a:solidFill>
+                  <a:srgbClr val="CECAC3"/>
+                </a:solidFill>
+                <a:effectLst/>
+                <a:latin typeface="Söhne"/>
+              </a:rPr>
+              <a:t> </a:t>
+            </a:r>
+            <a:r>
+              <a:rPr lang="fr-FR" b="0" i="0" u="sng" dirty="0" err="1">
+                <a:solidFill>
+                  <a:srgbClr val="CECAC3"/>
+                </a:solidFill>
+                <a:effectLst/>
+                <a:latin typeface="Söhne"/>
+              </a:rPr>
+              <a:t>allorché</a:t>
+            </a:r>
+            <a:r>
+              <a:rPr lang="fr-FR" b="0" i="0" u="sng" dirty="0">
+                <a:solidFill>
+                  <a:srgbClr val="CECAC3"/>
+                </a:solidFill>
+                <a:effectLst/>
+                <a:latin typeface="Söhne"/>
+              </a:rPr>
+              <a:t> </a:t>
+            </a:r>
+            <a:r>
+              <a:rPr lang="fr-FR" b="0" i="0" u="sng" dirty="0" err="1">
+                <a:solidFill>
+                  <a:srgbClr val="CECAC3"/>
+                </a:solidFill>
+                <a:effectLst/>
+                <a:latin typeface="Söhne"/>
+              </a:rPr>
+              <a:t>questi</a:t>
+            </a:r>
+            <a:r>
+              <a:rPr lang="fr-FR" b="0" i="0" u="sng" dirty="0">
+                <a:solidFill>
+                  <a:srgbClr val="CECAC3"/>
+                </a:solidFill>
+                <a:effectLst/>
+                <a:latin typeface="Söhne"/>
+              </a:rPr>
+              <a:t> </a:t>
+            </a:r>
+            <a:r>
+              <a:rPr lang="fr-FR" b="0" i="0" u="sng" dirty="0" err="1">
+                <a:solidFill>
+                  <a:srgbClr val="CECAC3"/>
+                </a:solidFill>
+                <a:effectLst/>
+                <a:latin typeface="Söhne"/>
+              </a:rPr>
+              <a:t>pazienti</a:t>
+            </a:r>
+            <a:r>
+              <a:rPr lang="fr-FR" b="0" i="0" u="sng" dirty="0">
+                <a:solidFill>
+                  <a:srgbClr val="CECAC3"/>
+                </a:solidFill>
+                <a:effectLst/>
+                <a:latin typeface="Söhne"/>
+              </a:rPr>
+              <a:t> sono </a:t>
+            </a:r>
+            <a:r>
+              <a:rPr lang="fr-FR" b="0" i="0" u="sng" dirty="0" err="1">
+                <a:solidFill>
+                  <a:srgbClr val="CECAC3"/>
+                </a:solidFill>
+                <a:effectLst/>
+                <a:latin typeface="Söhne"/>
+              </a:rPr>
+              <a:t>presi</a:t>
+            </a:r>
+            <a:r>
+              <a:rPr lang="fr-FR" b="0" i="0" u="sng" dirty="0">
+                <a:solidFill>
+                  <a:srgbClr val="CECAC3"/>
+                </a:solidFill>
+                <a:effectLst/>
+                <a:latin typeface="Söhne"/>
+              </a:rPr>
+              <a:t> in </a:t>
+            </a:r>
+            <a:r>
+              <a:rPr lang="fr-FR" b="0" i="0" u="sng" dirty="0" err="1">
+                <a:solidFill>
+                  <a:srgbClr val="CECAC3"/>
+                </a:solidFill>
+                <a:effectLst/>
+                <a:latin typeface="Söhne"/>
+              </a:rPr>
+              <a:t>carico</a:t>
+            </a:r>
+            <a:r>
+              <a:rPr lang="fr-FR" b="0" i="0" u="sng" dirty="0">
+                <a:solidFill>
+                  <a:srgbClr val="CECAC3"/>
+                </a:solidFill>
+                <a:effectLst/>
+                <a:latin typeface="Söhne"/>
+              </a:rPr>
+              <a:t> anche </a:t>
+            </a:r>
+            <a:r>
+              <a:rPr lang="fr-FR" b="0" i="0" u="sng" dirty="0" err="1">
+                <a:solidFill>
+                  <a:srgbClr val="CECAC3"/>
+                </a:solidFill>
+                <a:effectLst/>
+                <a:latin typeface="Söhne"/>
+              </a:rPr>
+              <a:t>altrove</a:t>
+            </a:r>
+            <a:r>
+              <a:rPr lang="fr-FR" b="0" i="0" u="sng" dirty="0">
+                <a:solidFill>
+                  <a:srgbClr val="CECAC3"/>
+                </a:solidFill>
+                <a:effectLst/>
+                <a:latin typeface="Söhne"/>
+              </a:rPr>
+              <a:t> e la </a:t>
+            </a:r>
+            <a:r>
+              <a:rPr lang="fr-FR" b="0" i="0" u="sng" dirty="0" err="1">
+                <a:solidFill>
+                  <a:srgbClr val="CECAC3"/>
+                </a:solidFill>
+                <a:effectLst/>
+                <a:latin typeface="Söhne"/>
+              </a:rPr>
+              <a:t>sorveglianza</a:t>
+            </a:r>
+            <a:r>
+              <a:rPr lang="fr-FR" b="0" i="0" u="sng" dirty="0">
+                <a:solidFill>
+                  <a:srgbClr val="CECAC3"/>
+                </a:solidFill>
+                <a:effectLst/>
+                <a:latin typeface="Söhne"/>
+              </a:rPr>
+              <a:t> </a:t>
+            </a:r>
+            <a:r>
+              <a:rPr lang="fr-FR" b="0" i="0" u="sng" dirty="0" err="1">
+                <a:solidFill>
+                  <a:srgbClr val="CECAC3"/>
+                </a:solidFill>
+                <a:effectLst/>
+                <a:latin typeface="Söhne"/>
+              </a:rPr>
+              <a:t>attuale</a:t>
+            </a:r>
+            <a:r>
+              <a:rPr lang="fr-FR" b="0" i="0" u="sng" dirty="0">
+                <a:solidFill>
+                  <a:srgbClr val="CECAC3"/>
+                </a:solidFill>
+                <a:effectLst/>
+                <a:latin typeface="Söhne"/>
+              </a:rPr>
+              <a:t> ignora la </a:t>
+            </a:r>
+            <a:r>
+              <a:rPr lang="fr-FR" b="0" i="0" u="sng" dirty="0" err="1">
+                <a:solidFill>
+                  <a:srgbClr val="CECAC3"/>
+                </a:solidFill>
+                <a:effectLst/>
+                <a:latin typeface="Söhne"/>
+              </a:rPr>
+              <a:t>pediatria</a:t>
+            </a:r>
             <a:endParaRPr lang="fr-FR" b="0" i="0" u="sng" dirty="0">
               <a:solidFill>
                 <a:srgbClr val="CECAC3"/>
@@ -25087,12 +25131,26 @@
           </a:p>
           <a:p>
             <a:pPr algn="l"/>
+            <a:endParaRPr lang="fr-FR" b="1" i="0" u="sng" dirty="0">
+              <a:effectLst/>
+              <a:latin typeface="Söhne"/>
+            </a:endParaRPr>
+          </a:p>
+          <a:p>
+            <a:pPr algn="l"/>
+            <a:endParaRPr lang="fr-FR" b="1" i="0" u="sng" dirty="0">
+              <a:effectLst/>
+              <a:latin typeface="Söhne"/>
+            </a:endParaRPr>
+          </a:p>
+          <a:p>
+            <a:pPr algn="l"/>
             <a:r>
               <a:rPr lang="fr-FR" b="1" i="0" u="sng" dirty="0">
                 <a:effectLst/>
                 <a:latin typeface="Söhne"/>
               </a:rPr>
-              <a:t>Diapositive : Interprétation des Résultats</a:t>
+              <a:t>Diapositive : Limitations et Défis</a:t>
             </a:r>
           </a:p>
           <a:p>
@@ -25108,7 +25166,7 @@
                 <a:effectLst/>
                 <a:latin typeface="Söhne"/>
               </a:rPr>
-              <a:t>L'algorithme présente un bon équilibre entre sensibilité et spécificité, suggérant une application robuste et fiable pour le suivi des SSI.</a:t>
+              <a:t>Sensibilité plus faible due à des notes cliniques vagues et à une réticence à documenter les complications.</a:t>
             </a:r>
           </a:p>
           <a:p>
@@ -25124,7 +25182,7 @@
                 <a:effectLst/>
                 <a:latin typeface="Söhne"/>
               </a:rPr>
-              <a:t>Les gains d'efficacité en temps et en coûts sont substantiels, ce qui permet une meilleure allocation des ressources humaines.</a:t>
+              <a:t>Absence d’un gold standard.</a:t>
             </a:r>
           </a:p>
           <a:p>
@@ -25140,7 +25198,7 @@
                 <a:effectLst/>
                 <a:latin typeface="Söhne"/>
               </a:rPr>
-              <a:t> L’</a:t>
+              <a:t>"</a:t>
             </a:r>
             <a:r>
               <a:rPr lang="fr-FR" b="0" i="0" u="sng" dirty="0" err="1">
@@ -25150,7 +25208,7 @@
                 <a:effectLst/>
                 <a:latin typeface="Söhne"/>
               </a:rPr>
-              <a:t>algoritmo</a:t>
+              <a:t>Unknown</a:t>
             </a:r>
             <a:r>
               <a:rPr lang="fr-FR" b="0" i="0" u="sng" dirty="0">
@@ -25170,7 +25228,7 @@
                 <a:effectLst/>
                 <a:latin typeface="Söhne"/>
               </a:rPr>
-              <a:t>estende</a:t>
+              <a:t>Unknowns</a:t>
             </a:r>
             <a:r>
               <a:rPr lang="fr-FR" b="0" i="0" u="sng" dirty="0">
@@ -25180,318 +25238,14 @@
                 <a:effectLst/>
                 <a:latin typeface="Söhne"/>
               </a:rPr>
-              <a:t> la </a:t>
-            </a:r>
-            <a:r>
-              <a:rPr lang="fr-FR" b="0" i="0" u="sng" dirty="0" err="1">
-                <a:solidFill>
-                  <a:srgbClr val="CECAC3"/>
-                </a:solidFill>
-                <a:effectLst/>
-                <a:latin typeface="Söhne"/>
-              </a:rPr>
-              <a:t>sorveglianza</a:t>
-            </a:r>
-            <a:r>
-              <a:rPr lang="fr-FR" b="0" i="0" u="sng" dirty="0">
-                <a:solidFill>
-                  <a:srgbClr val="CECAC3"/>
-                </a:solidFill>
-                <a:effectLst/>
-                <a:latin typeface="Söhne"/>
-              </a:rPr>
-              <a:t> a tutti i </a:t>
-            </a:r>
-            <a:r>
-              <a:rPr lang="fr-FR" b="0" i="0" u="sng" dirty="0" err="1">
-                <a:solidFill>
-                  <a:srgbClr val="CECAC3"/>
-                </a:solidFill>
-                <a:effectLst/>
-                <a:latin typeface="Söhne"/>
-              </a:rPr>
-              <a:t>servizi</a:t>
-            </a:r>
-            <a:r>
-              <a:rPr lang="fr-FR" b="0" i="0" u="sng" dirty="0">
-                <a:solidFill>
-                  <a:srgbClr val="CECAC3"/>
-                </a:solidFill>
-                <a:effectLst/>
-                <a:latin typeface="Söhne"/>
-              </a:rPr>
-              <a:t> </a:t>
-            </a:r>
-            <a:r>
-              <a:rPr lang="fr-FR" b="0" i="0" u="sng" dirty="0" err="1">
-                <a:solidFill>
-                  <a:srgbClr val="CECAC3"/>
-                </a:solidFill>
-                <a:effectLst/>
-                <a:latin typeface="Söhne"/>
-              </a:rPr>
-              <a:t>mentre</a:t>
-            </a:r>
-            <a:r>
-              <a:rPr lang="fr-FR" b="0" i="0" u="sng" dirty="0">
-                <a:solidFill>
-                  <a:srgbClr val="CECAC3"/>
-                </a:solidFill>
-                <a:effectLst/>
-                <a:latin typeface="Söhne"/>
-              </a:rPr>
-              <a:t> </a:t>
-            </a:r>
-            <a:r>
-              <a:rPr lang="fr-FR" b="0" i="0" u="sng" dirty="0" err="1">
-                <a:solidFill>
-                  <a:srgbClr val="CECAC3"/>
-                </a:solidFill>
-                <a:effectLst/>
-                <a:latin typeface="Söhne"/>
-              </a:rPr>
-              <a:t>adesso</a:t>
-            </a:r>
-            <a:r>
-              <a:rPr lang="fr-FR" b="0" i="0" u="sng" dirty="0">
-                <a:solidFill>
-                  <a:srgbClr val="CECAC3"/>
-                </a:solidFill>
-                <a:effectLst/>
-                <a:latin typeface="Söhne"/>
-              </a:rPr>
-              <a:t> solo </a:t>
-            </a:r>
-            <a:r>
-              <a:rPr lang="fr-FR" b="0" i="0" u="sng" dirty="0" err="1">
-                <a:solidFill>
-                  <a:srgbClr val="CECAC3"/>
-                </a:solidFill>
-                <a:effectLst/>
-                <a:latin typeface="Söhne"/>
-              </a:rPr>
-              <a:t>ortopedia</a:t>
-            </a:r>
-            <a:r>
-              <a:rPr lang="fr-FR" b="0" i="0" u="sng" dirty="0">
-                <a:solidFill>
-                  <a:srgbClr val="CECAC3"/>
-                </a:solidFill>
-                <a:effectLst/>
-                <a:latin typeface="Söhne"/>
-              </a:rPr>
-              <a:t> e </a:t>
-            </a:r>
-            <a:r>
-              <a:rPr lang="fr-FR" b="0" i="0" u="sng" dirty="0" err="1">
-                <a:solidFill>
-                  <a:srgbClr val="CECAC3"/>
-                </a:solidFill>
-                <a:effectLst/>
-                <a:latin typeface="Söhne"/>
-              </a:rPr>
-              <a:t>neurologia</a:t>
-            </a:r>
-            <a:r>
-              <a:rPr lang="fr-FR" b="0" i="0" u="sng" dirty="0">
-                <a:solidFill>
-                  <a:srgbClr val="CECAC3"/>
-                </a:solidFill>
-                <a:effectLst/>
-                <a:latin typeface="Söhne"/>
-              </a:rPr>
-              <a:t> sono </a:t>
-            </a:r>
-            <a:r>
-              <a:rPr lang="fr-FR" b="0" i="0" u="sng" dirty="0" err="1">
-                <a:solidFill>
-                  <a:srgbClr val="CECAC3"/>
-                </a:solidFill>
-                <a:effectLst/>
-                <a:latin typeface="Söhne"/>
-              </a:rPr>
-              <a:t>sorvegliati</a:t>
-            </a:r>
-            <a:r>
-              <a:rPr lang="fr-FR" b="0" i="0" u="sng" dirty="0">
-                <a:solidFill>
-                  <a:srgbClr val="CECAC3"/>
-                </a:solidFill>
-                <a:effectLst/>
-                <a:latin typeface="Söhne"/>
-              </a:rPr>
-              <a:t> </a:t>
-            </a:r>
-            <a:r>
-              <a:rPr lang="fr-FR" b="0" i="0" u="sng" dirty="0" err="1">
-                <a:solidFill>
-                  <a:srgbClr val="CECAC3"/>
-                </a:solidFill>
-                <a:effectLst/>
-                <a:latin typeface="Söhne"/>
-              </a:rPr>
-              <a:t>allorché</a:t>
-            </a:r>
-            <a:r>
-              <a:rPr lang="fr-FR" b="0" i="0" u="sng" dirty="0">
-                <a:solidFill>
-                  <a:srgbClr val="CECAC3"/>
-                </a:solidFill>
-                <a:effectLst/>
-                <a:latin typeface="Söhne"/>
-              </a:rPr>
-              <a:t> </a:t>
-            </a:r>
-            <a:r>
-              <a:rPr lang="fr-FR" b="0" i="0" u="sng" dirty="0" err="1">
-                <a:solidFill>
-                  <a:srgbClr val="CECAC3"/>
-                </a:solidFill>
-                <a:effectLst/>
-                <a:latin typeface="Söhne"/>
-              </a:rPr>
-              <a:t>questi</a:t>
-            </a:r>
-            <a:r>
-              <a:rPr lang="fr-FR" b="0" i="0" u="sng" dirty="0">
-                <a:solidFill>
-                  <a:srgbClr val="CECAC3"/>
-                </a:solidFill>
-                <a:effectLst/>
-                <a:latin typeface="Söhne"/>
-              </a:rPr>
-              <a:t> </a:t>
-            </a:r>
-            <a:r>
-              <a:rPr lang="fr-FR" b="0" i="0" u="sng" dirty="0" err="1">
-                <a:solidFill>
-                  <a:srgbClr val="CECAC3"/>
-                </a:solidFill>
-                <a:effectLst/>
-                <a:latin typeface="Söhne"/>
-              </a:rPr>
-              <a:t>pazienti</a:t>
-            </a:r>
-            <a:r>
-              <a:rPr lang="fr-FR" b="0" i="0" u="sng" dirty="0">
-                <a:solidFill>
-                  <a:srgbClr val="CECAC3"/>
-                </a:solidFill>
-                <a:effectLst/>
-                <a:latin typeface="Söhne"/>
-              </a:rPr>
-              <a:t> sono </a:t>
-            </a:r>
-            <a:r>
-              <a:rPr lang="fr-FR" b="0" i="0" u="sng" dirty="0" err="1">
-                <a:solidFill>
-                  <a:srgbClr val="CECAC3"/>
-                </a:solidFill>
-                <a:effectLst/>
-                <a:latin typeface="Söhne"/>
-              </a:rPr>
-              <a:t>presi</a:t>
-            </a:r>
-            <a:r>
-              <a:rPr lang="fr-FR" b="0" i="0" u="sng" dirty="0">
-                <a:solidFill>
-                  <a:srgbClr val="CECAC3"/>
-                </a:solidFill>
-                <a:effectLst/>
-                <a:latin typeface="Söhne"/>
-              </a:rPr>
-              <a:t> in </a:t>
-            </a:r>
-            <a:r>
-              <a:rPr lang="fr-FR" b="0" i="0" u="sng" dirty="0" err="1">
-                <a:solidFill>
-                  <a:srgbClr val="CECAC3"/>
-                </a:solidFill>
-                <a:effectLst/>
-                <a:latin typeface="Söhne"/>
-              </a:rPr>
-              <a:t>carico</a:t>
-            </a:r>
-            <a:r>
-              <a:rPr lang="fr-FR" b="0" i="0" u="sng" dirty="0">
-                <a:solidFill>
-                  <a:srgbClr val="CECAC3"/>
-                </a:solidFill>
-                <a:effectLst/>
-                <a:latin typeface="Söhne"/>
-              </a:rPr>
-              <a:t> anche </a:t>
-            </a:r>
-            <a:r>
-              <a:rPr lang="fr-FR" b="0" i="0" u="sng" dirty="0" err="1">
-                <a:solidFill>
-                  <a:srgbClr val="CECAC3"/>
-                </a:solidFill>
-                <a:effectLst/>
-                <a:latin typeface="Söhne"/>
-              </a:rPr>
-              <a:t>altrove</a:t>
-            </a:r>
-            <a:r>
-              <a:rPr lang="fr-FR" b="0" i="0" u="sng" dirty="0">
-                <a:solidFill>
-                  <a:srgbClr val="CECAC3"/>
-                </a:solidFill>
-                <a:effectLst/>
-                <a:latin typeface="Söhne"/>
-              </a:rPr>
-              <a:t> e la </a:t>
-            </a:r>
-            <a:r>
-              <a:rPr lang="fr-FR" b="0" i="0" u="sng" dirty="0" err="1">
-                <a:solidFill>
-                  <a:srgbClr val="CECAC3"/>
-                </a:solidFill>
-                <a:effectLst/>
-                <a:latin typeface="Söhne"/>
-              </a:rPr>
-              <a:t>sorveglianza</a:t>
-            </a:r>
-            <a:r>
-              <a:rPr lang="fr-FR" b="0" i="0" u="sng" dirty="0">
-                <a:solidFill>
-                  <a:srgbClr val="CECAC3"/>
-                </a:solidFill>
-                <a:effectLst/>
-                <a:latin typeface="Söhne"/>
-              </a:rPr>
-              <a:t> </a:t>
-            </a:r>
-            <a:r>
-              <a:rPr lang="fr-FR" b="0" i="0" u="sng" dirty="0" err="1">
-                <a:solidFill>
-                  <a:srgbClr val="CECAC3"/>
-                </a:solidFill>
-                <a:effectLst/>
-                <a:latin typeface="Söhne"/>
-              </a:rPr>
-              <a:t>attuale</a:t>
-            </a:r>
-            <a:r>
-              <a:rPr lang="fr-FR" b="0" i="0" u="sng" dirty="0">
-                <a:solidFill>
-                  <a:srgbClr val="CECAC3"/>
-                </a:solidFill>
-                <a:effectLst/>
-                <a:latin typeface="Söhne"/>
-              </a:rPr>
-              <a:t> ignora la </a:t>
-            </a:r>
-            <a:r>
-              <a:rPr lang="fr-FR" b="0" i="0" u="sng" dirty="0" err="1">
-                <a:solidFill>
-                  <a:srgbClr val="CECAC3"/>
-                </a:solidFill>
-                <a:effectLst/>
-                <a:latin typeface="Söhne"/>
-              </a:rPr>
-              <a:t>pediatria</a:t>
-            </a:r>
+              <a:t>" : si les patients ne reviennent pas à l'hôpital, les cas ne seront jamais capturés</a:t>
+            </a:r>
+          </a:p>
+          <a:p>
+            <a:pPr algn="l">
+              <a:buFont typeface="Arial" panose="020B0604020202020204" pitchFamily="34" charset="0"/>
+              <a:buChar char="•"/>
+            </a:pPr>
             <a:endParaRPr lang="fr-FR" b="0" i="0" u="sng" dirty="0">
               <a:solidFill>
                 <a:srgbClr val="CECAC3"/>
@@ -25512,48 +25266,6 @@
               <a:effectLst/>
               <a:latin typeface="Söhne"/>
             </a:endParaRPr>
-          </a:p>
-          <a:p>
-            <a:pPr algn="l"/>
-            <a:r>
-              <a:rPr lang="fr-FR" b="1" i="0" u="sng" dirty="0">
-                <a:effectLst/>
-                <a:latin typeface="Söhne"/>
-              </a:rPr>
-              <a:t>Diapositive : Implications et Directions Futures</a:t>
-            </a:r>
-          </a:p>
-          <a:p>
-            <a:pPr algn="l">
-              <a:buFont typeface="Arial" panose="020B0604020202020204" pitchFamily="34" charset="0"/>
-              <a:buChar char="•"/>
-            </a:pPr>
-            <a:r>
-              <a:rPr lang="fr-FR" b="0" i="0" u="sng" dirty="0">
-                <a:solidFill>
-                  <a:srgbClr val="CECAC3"/>
-                </a:solidFill>
-                <a:effectLst/>
-                <a:latin typeface="Söhne"/>
-              </a:rPr>
-              <a:t>Possibilité d'adapter l'algorithme pour d'autres types de chirurgies et complications.</a:t>
-            </a:r>
-          </a:p>
-          <a:p>
-            <a:pPr algn="l">
-              <a:buFont typeface="Arial" panose="020B0604020202020204" pitchFamily="34" charset="0"/>
-              <a:buChar char="•"/>
-            </a:pPr>
-            <a:r>
-              <a:rPr lang="fr-FR" b="0" i="0" u="sng" dirty="0">
-                <a:solidFill>
-                  <a:srgbClr val="CECAC3"/>
-                </a:solidFill>
-                <a:effectLst/>
-                <a:latin typeface="Söhne"/>
-              </a:rPr>
-              <a:t>Création d'une boucle de rétroaction plus transparente et immédiate, qui pourrait être instrumentale pour améliorer les procédures chirurgicales et les soins postopératoires.</a:t>
-            </a:r>
           </a:p>
         </p:txBody>
       </p:sp>
@@ -25708,6 +25420,54 @@
                 <a:latin typeface="Söhne"/>
               </a:rPr>
               <a:t>Des travaux futurs sont nécessaires pour affiner l'algorithme et pour explorer son applicabilité à d'autres domaines chirurgicaux.</a:t>
+            </a:r>
+          </a:p>
+          <a:p>
+            <a:endParaRPr lang="it-IT" dirty="0"/>
+          </a:p>
+          <a:p>
+            <a:endParaRPr lang="it-IT" dirty="0"/>
+          </a:p>
+          <a:p>
+            <a:pPr algn="l"/>
+            <a:r>
+              <a:rPr lang="fr-FR" b="1" i="0" u="sng" dirty="0">
+                <a:effectLst/>
+                <a:latin typeface="Söhne"/>
+              </a:rPr>
+              <a:t>Diapositive : Implications et Directions Futures</a:t>
+            </a:r>
+          </a:p>
+          <a:p>
+            <a:pPr algn="l">
+              <a:buFont typeface="Arial" panose="020B0604020202020204" pitchFamily="34" charset="0"/>
+              <a:buChar char="•"/>
+            </a:pPr>
+            <a:r>
+              <a:rPr lang="fr-FR" b="0" i="0" u="sng" dirty="0">
+                <a:solidFill>
+                  <a:srgbClr val="CECAC3"/>
+                </a:solidFill>
+                <a:effectLst/>
+                <a:latin typeface="Söhne"/>
+              </a:rPr>
+              <a:t>Possibilité d'adapter l'algorithme pour d'autres types de chirurgies et complications.</a:t>
+            </a:r>
+          </a:p>
+          <a:p>
+            <a:pPr algn="l">
+              <a:buFont typeface="Arial" panose="020B0604020202020204" pitchFamily="34" charset="0"/>
+              <a:buChar char="•"/>
+            </a:pPr>
+            <a:r>
+              <a:rPr lang="fr-FR" b="0" i="0" u="sng" dirty="0">
+                <a:solidFill>
+                  <a:srgbClr val="CECAC3"/>
+                </a:solidFill>
+                <a:effectLst/>
+                <a:latin typeface="Söhne"/>
+              </a:rPr>
+              <a:t>Création d'une boucle de rétroaction plus transparente et immédiate, qui pourrait être instrumentale pour améliorer les procédures chirurgicales et les soins postopératoires.</a:t>
             </a:r>
           </a:p>
           <a:p>
@@ -25898,7 +25658,7 @@
           <a:p>
             <a:fld id="{290879BB-EB53-48BE-94EC-8CEA99C9E6F9}" type="datetimeFigureOut">
               <a:rPr lang="it-IT" smtClean="0"/>
-              <a:t>25/09/2023</a:t>
+              <a:t>26/09/2023</a:t>
             </a:fld>
             <a:endParaRPr lang="it-IT" dirty="0"/>
           </a:p>
@@ -26096,7 +25856,7 @@
           <a:p>
             <a:fld id="{290879BB-EB53-48BE-94EC-8CEA99C9E6F9}" type="datetimeFigureOut">
               <a:rPr lang="it-IT" smtClean="0"/>
-              <a:t>25/09/2023</a:t>
+              <a:t>26/09/2023</a:t>
             </a:fld>
             <a:endParaRPr lang="it-IT" dirty="0"/>
           </a:p>
@@ -26304,7 +26064,7 @@
           <a:p>
             <a:fld id="{290879BB-EB53-48BE-94EC-8CEA99C9E6F9}" type="datetimeFigureOut">
               <a:rPr lang="it-IT" smtClean="0"/>
-              <a:t>25/09/2023</a:t>
+              <a:t>26/09/2023</a:t>
             </a:fld>
             <a:endParaRPr lang="it-IT" dirty="0"/>
           </a:p>
@@ -26502,7 +26262,7 @@
           <a:p>
             <a:fld id="{290879BB-EB53-48BE-94EC-8CEA99C9E6F9}" type="datetimeFigureOut">
               <a:rPr lang="it-IT" smtClean="0"/>
-              <a:t>25/09/2023</a:t>
+              <a:t>26/09/2023</a:t>
             </a:fld>
             <a:endParaRPr lang="it-IT" dirty="0"/>
           </a:p>
@@ -26777,7 +26537,7 @@
           <a:p>
             <a:fld id="{290879BB-EB53-48BE-94EC-8CEA99C9E6F9}" type="datetimeFigureOut">
               <a:rPr lang="it-IT" smtClean="0"/>
-              <a:t>25/09/2023</a:t>
+              <a:t>26/09/2023</a:t>
             </a:fld>
             <a:endParaRPr lang="it-IT" dirty="0"/>
           </a:p>
@@ -27042,7 +26802,7 @@
           <a:p>
             <a:fld id="{290879BB-EB53-48BE-94EC-8CEA99C9E6F9}" type="datetimeFigureOut">
               <a:rPr lang="it-IT" smtClean="0"/>
-              <a:t>25/09/2023</a:t>
+              <a:t>26/09/2023</a:t>
             </a:fld>
             <a:endParaRPr lang="it-IT" dirty="0"/>
           </a:p>
@@ -27454,7 +27214,7 @@
           <a:p>
             <a:fld id="{290879BB-EB53-48BE-94EC-8CEA99C9E6F9}" type="datetimeFigureOut">
               <a:rPr lang="it-IT" smtClean="0"/>
-              <a:t>25/09/2023</a:t>
+              <a:t>26/09/2023</a:t>
             </a:fld>
             <a:endParaRPr lang="it-IT" dirty="0"/>
           </a:p>
@@ -27595,7 +27355,7 @@
           <a:p>
             <a:fld id="{290879BB-EB53-48BE-94EC-8CEA99C9E6F9}" type="datetimeFigureOut">
               <a:rPr lang="it-IT" smtClean="0"/>
-              <a:t>25/09/2023</a:t>
+              <a:t>26/09/2023</a:t>
             </a:fld>
             <a:endParaRPr lang="it-IT" dirty="0"/>
           </a:p>
@@ -27708,7 +27468,7 @@
           <a:p>
             <a:fld id="{290879BB-EB53-48BE-94EC-8CEA99C9E6F9}" type="datetimeFigureOut">
               <a:rPr lang="it-IT" smtClean="0"/>
-              <a:t>25/09/2023</a:t>
+              <a:t>26/09/2023</a:t>
             </a:fld>
             <a:endParaRPr lang="it-IT" dirty="0"/>
           </a:p>
@@ -28019,7 +27779,7 @@
           <a:p>
             <a:fld id="{290879BB-EB53-48BE-94EC-8CEA99C9E6F9}" type="datetimeFigureOut">
               <a:rPr lang="it-IT" smtClean="0"/>
-              <a:t>25/09/2023</a:t>
+              <a:t>26/09/2023</a:t>
             </a:fld>
             <a:endParaRPr lang="it-IT" dirty="0"/>
           </a:p>
@@ -28307,7 +28067,7 @@
           <a:p>
             <a:fld id="{290879BB-EB53-48BE-94EC-8CEA99C9E6F9}" type="datetimeFigureOut">
               <a:rPr lang="it-IT" smtClean="0"/>
-              <a:t>25/09/2023</a:t>
+              <a:t>26/09/2023</a:t>
             </a:fld>
             <a:endParaRPr lang="it-IT" dirty="0"/>
           </a:p>
@@ -28548,7 +28308,7 @@
           <a:p>
             <a:fld id="{290879BB-EB53-48BE-94EC-8CEA99C9E6F9}" type="datetimeFigureOut">
               <a:rPr lang="it-IT" smtClean="0"/>
-              <a:t>25/09/2023</a:t>
+              <a:t>26/09/2023</a:t>
             </a:fld>
             <a:endParaRPr lang="it-IT" dirty="0"/>
           </a:p>
@@ -29230,10 +28990,27 @@
               </a:rPr>
               <a:t>Conclusions</a:t>
             </a:r>
-            <a:endParaRPr lang="it-IT" dirty="0">
-              <a:latin typeface="Roboto Black" panose="02000000000000000000" pitchFamily="2" charset="0"/>
-              <a:ea typeface="Roboto Black" panose="02000000000000000000" pitchFamily="2" charset="0"/>
-            </a:endParaRPr>
+            <a:r>
+              <a:rPr lang="it-IT" dirty="0">
+                <a:latin typeface="Roboto Black" panose="02000000000000000000" pitchFamily="2" charset="0"/>
+                <a:ea typeface="Roboto Black" panose="02000000000000000000" pitchFamily="2" charset="0"/>
+              </a:rPr>
+              <a:t> et </a:t>
+            </a:r>
+            <a:r>
+              <a:rPr lang="it-IT" dirty="0" err="1">
+                <a:latin typeface="Roboto Black" panose="02000000000000000000" pitchFamily="2" charset="0"/>
+                <a:ea typeface="Roboto Black" panose="02000000000000000000" pitchFamily="2" charset="0"/>
+              </a:rPr>
+              <a:t>directions</a:t>
+            </a:r>
+            <a:r>
+              <a:rPr lang="it-IT" dirty="0">
+                <a:latin typeface="Roboto Black" panose="02000000000000000000" pitchFamily="2" charset="0"/>
+                <a:ea typeface="Roboto Black" panose="02000000000000000000" pitchFamily="2" charset="0"/>
+              </a:rPr>
+              <a:t> futures</a:t>
+            </a:r>
           </a:p>
         </p:txBody>
       </p:sp>
@@ -29607,144 +29384,6 @@
     <p:extLst>
       <p:ext uri="{BB962C8B-B14F-4D97-AF65-F5344CB8AC3E}">
         <p14:creationId xmlns:p14="http://schemas.microsoft.com/office/powerpoint/2010/main" val="1172203281"/>
-      </p:ext>
-    </p:extLst>
-  </p:cSld>
-  <p:clrMapOvr>
-    <a:masterClrMapping/>
-  </p:clrMapOvr>
-</p:sld>
-</file>
-
-<file path=ppt/slides/slide11.xml><?xml version="1.0" encoding="utf-8"?>
-<p:sld xmlns:a="http://schemas.openxmlformats.org/drawingml/2006/main" xmlns:r="http://schemas.openxmlformats.org/officeDocument/2006/relationships" xmlns:p="http://schemas.openxmlformats.org/presentationml/2006/main">
-  <p:cSld>
-    <p:spTree>
-      <p:nvGrpSpPr>
-        <p:cNvPr id="1" name=""/>
-        <p:cNvGrpSpPr/>
-        <p:nvPr/>
-      </p:nvGrpSpPr>
-      <p:grpSpPr>
-        <a:xfrm>
-          <a:off x="0" y="0"/>
-          <a:ext cx="0" cy="0"/>
-          <a:chOff x="0" y="0"/>
-          <a:chExt cx="0" cy="0"/>
-        </a:xfrm>
-      </p:grpSpPr>
-      <p:sp>
-        <p:nvSpPr>
-          <p:cNvPr id="2" name="Titolo 1">
-            <a:extLst>
-              <a:ext uri="{FF2B5EF4-FFF2-40B4-BE49-F238E27FC236}">
-                <a16:creationId xmlns:a16="http://schemas.microsoft.com/office/drawing/2014/main" id="{EA201E6B-2804-4DE8-65DF-C1C71A384484}"/>
-              </a:ext>
-            </a:extLst>
-          </p:cNvPr>
-          <p:cNvSpPr>
-            <a:spLocks noGrp="1"/>
-          </p:cNvSpPr>
-          <p:nvPr>
-            <p:ph type="title"/>
-          </p:nvPr>
-        </p:nvSpPr>
-        <p:spPr>
-          <a:xfrm>
-            <a:off x="838199" y="0"/>
-            <a:ext cx="10515600" cy="1325563"/>
-          </a:xfrm>
-        </p:spPr>
-        <p:txBody>
-          <a:bodyPr/>
-          <a:lstStyle/>
-          <a:p>
-            <a:pPr algn="ctr"/>
-            <a:r>
-              <a:rPr lang="it-IT" dirty="0">
-                <a:latin typeface="Roboto Medium" panose="02000000000000000000" pitchFamily="2" charset="0"/>
-                <a:ea typeface="Roboto Medium" panose="02000000000000000000" pitchFamily="2" charset="0"/>
-              </a:rPr>
-              <a:t>Grazie</a:t>
-            </a:r>
-            <a:r>
-              <a:rPr lang="it-IT" dirty="0"/>
-              <a:t> </a:t>
-            </a:r>
-            <a:r>
-              <a:rPr lang="it-IT" dirty="0">
-                <a:latin typeface="Roboto Medium" panose="02000000000000000000" pitchFamily="2" charset="0"/>
-                <a:ea typeface="Roboto Medium" panose="02000000000000000000" pitchFamily="2" charset="0"/>
-              </a:rPr>
-              <a:t>per</a:t>
-            </a:r>
-            <a:r>
-              <a:rPr lang="it-IT" dirty="0"/>
-              <a:t> </a:t>
-            </a:r>
-            <a:r>
-              <a:rPr lang="it-IT" dirty="0">
-                <a:latin typeface="Roboto Medium" panose="02000000000000000000" pitchFamily="2" charset="0"/>
-                <a:ea typeface="Roboto Medium" panose="02000000000000000000" pitchFamily="2" charset="0"/>
-              </a:rPr>
-              <a:t>l’attenzione</a:t>
-            </a:r>
-          </a:p>
-        </p:txBody>
-      </p:sp>
-      <p:pic>
-        <p:nvPicPr>
-          <p:cNvPr id="2050" name="Picture 2" descr="Un supercomputer malvagio, adornato come un hippie">
-            <a:extLst>
-              <a:ext uri="{FF2B5EF4-FFF2-40B4-BE49-F238E27FC236}">
-                <a16:creationId xmlns:a16="http://schemas.microsoft.com/office/drawing/2014/main" id="{1F75C9C7-BEE7-F32F-69D2-2B75FE0F9070}"/>
-              </a:ext>
-            </a:extLst>
-          </p:cNvPr>
-          <p:cNvPicPr>
-            <a:picLocks noGrp="1" noChangeAspect="1" noChangeArrowheads="1"/>
-          </p:cNvPicPr>
-          <p:nvPr>
-            <p:ph idx="1"/>
-          </p:nvPr>
-        </p:nvPicPr>
-        <p:blipFill>
-          <a:blip r:embed="rId2">
-            <a:extLst>
-              <a:ext uri="{28A0092B-C50C-407E-A947-70E740481C1C}">
-                <a14:useLocalDpi xmlns:a14="http://schemas.microsoft.com/office/drawing/2010/main" val="0"/>
-              </a:ext>
-            </a:extLst>
-          </a:blip>
-          <a:srcRect/>
-          <a:stretch>
-            <a:fillRect/>
-          </a:stretch>
-        </p:blipFill>
-        <p:spPr bwMode="auto">
-          <a:xfrm>
-            <a:off x="3234229" y="1134459"/>
-            <a:ext cx="5723541" cy="5723541"/>
-          </a:xfrm>
-          <a:prstGeom prst="rect">
-            <a:avLst/>
-          </a:prstGeom>
-          <a:noFill/>
-          <a:extLst>
-            <a:ext uri="{909E8E84-426E-40DD-AFC4-6F175D3DCCD1}">
-              <a14:hiddenFill xmlns:a14="http://schemas.microsoft.com/office/drawing/2010/main">
-                <a:solidFill>
-                  <a:srgbClr val="FFFFFF"/>
-                </a:solidFill>
-              </a14:hiddenFill>
-            </a:ext>
-          </a:extLst>
-        </p:spPr>
-      </p:pic>
-    </p:spTree>
-    <p:extLst>
-      <p:ext uri="{BB962C8B-B14F-4D97-AF65-F5344CB8AC3E}">
-        <p14:creationId xmlns:p14="http://schemas.microsoft.com/office/powerpoint/2010/main" val="1138446184"/>
       </p:ext>
     </p:extLst>
   </p:cSld>
@@ -32057,8 +31696,8 @@
         </p:nvSpPr>
         <p:spPr>
           <a:xfrm>
-            <a:off x="534894" y="3013570"/>
-            <a:ext cx="10818905" cy="2784737"/>
+            <a:off x="534894" y="2235043"/>
+            <a:ext cx="5750855" cy="5000728"/>
           </a:xfrm>
           <a:prstGeom prst="rect">
             <a:avLst/>
@@ -32079,24 +31718,20 @@
               <a:buChar char="•"/>
             </a:pPr>
             <a:r>
+              <a:rPr lang="it-IT" b="1" dirty="0" err="1"/>
+              <a:t>Patients</a:t>
+            </a:r>
+            <a:r>
+              <a:rPr lang="it-IT" b="1" dirty="0"/>
+              <a:t> </a:t>
+            </a:r>
+            <a:r>
+              <a:rPr lang="it-IT" b="1" dirty="0" err="1"/>
+              <a:t>operés</a:t>
+            </a:r>
+            <a:r>
               <a:rPr lang="it-IT" dirty="0"/>
-              <a:t>652 </a:t>
-            </a:r>
-            <a:r>
-              <a:rPr lang="fr-BE" dirty="0"/>
-              <a:t>patients</a:t>
-            </a:r>
-            <a:r>
-              <a:rPr lang="it-IT" dirty="0"/>
-              <a:t> </a:t>
-            </a:r>
-            <a:r>
-              <a:rPr lang="it-IT" dirty="0" err="1"/>
-              <a:t>operés</a:t>
-            </a:r>
-            <a:r>
-              <a:rPr lang="it-IT" dirty="0"/>
-              <a:t> en 2020</a:t>
+              <a:t>: 652 en 2020</a:t>
             </a:r>
           </a:p>
           <a:p>
@@ -32108,12 +31743,20 @@
               <a:buChar char="•"/>
             </a:pPr>
             <a:r>
+              <a:rPr lang="it-IT" b="1" dirty="0" err="1"/>
+              <a:t>Infections</a:t>
+            </a:r>
+            <a:r>
+              <a:rPr lang="it-IT" b="1" dirty="0"/>
+              <a:t> : </a:t>
+            </a:r>
+            <a:r>
               <a:rPr lang="it-IT" dirty="0"/>
               <a:t>79 </a:t>
             </a:r>
             <a:r>
               <a:rPr lang="it-IT" dirty="0" err="1"/>
-              <a:t>infections</a:t>
+              <a:t>cas</a:t>
             </a:r>
             <a:r>
               <a:rPr lang="it-IT" dirty="0"/>
@@ -32121,28 +31764,9 @@
             </a:r>
             <a:r>
               <a:rPr lang="it-IT" dirty="0" err="1"/>
-              <a:t>correspondant</a:t>
-            </a:r>
-            <a:r>
-              <a:rPr lang="it-IT" dirty="0"/>
-              <a:t> </a:t>
-            </a:r>
-            <a:r>
-              <a:rPr lang="it-IT" dirty="0" err="1"/>
-              <a:t>aux</a:t>
-            </a:r>
-            <a:r>
-              <a:rPr lang="it-IT" dirty="0"/>
-              <a:t> </a:t>
-            </a:r>
-            <a:r>
-              <a:rPr lang="it-IT" dirty="0" err="1"/>
-              <a:t>critères</a:t>
-            </a:r>
-            <a:r>
-              <a:rPr lang="it-IT" dirty="0"/>
-              <a:t> d’ISO</a:t>
-            </a:r>
+              <a:t>pertinents</a:t>
+            </a:r>
+            <a:endParaRPr lang="it-IT" dirty="0"/>
           </a:p>
           <a:p>
             <a:pPr marL="285750" indent="-285750">
@@ -32153,12 +31777,20 @@
               <a:buChar char="•"/>
             </a:pPr>
             <a:r>
-              <a:rPr lang="it-IT" dirty="0" err="1"/>
+              <a:rPr lang="it-IT" b="1" dirty="0" err="1"/>
               <a:t>Prévalence</a:t>
             </a:r>
             <a:r>
               <a:rPr lang="it-IT" dirty="0"/>
-              <a:t> 12.1%</a:t>
+              <a:t> </a:t>
+            </a:r>
+            <a:r>
+              <a:rPr lang="it-IT" b="1" dirty="0"/>
+              <a:t>ISO</a:t>
+            </a:r>
+            <a:r>
+              <a:rPr lang="it-IT" dirty="0"/>
+              <a:t> : ~12.1%</a:t>
             </a:r>
           </a:p>
           <a:p>
@@ -32170,11 +31802,18 @@
               <a:buChar char="•"/>
             </a:pPr>
             <a:r>
+              <a:rPr lang="fr-FR" b="1" i="0" dirty="0">
+                <a:effectLst/>
+                <a:latin typeface="Söhne"/>
+              </a:rPr>
+              <a:t>Temps moyen </a:t>
+            </a:r>
+            <a:r>
               <a:rPr lang="fr-FR" b="0" i="0" dirty="0">
                 <a:effectLst/>
                 <a:latin typeface="Söhne"/>
               </a:rPr>
-              <a:t>Temps moyen par cas via </a:t>
+              <a:t>via </a:t>
             </a:r>
             <a:r>
               <a:rPr lang="fr-FR" b="0" i="0" dirty="0" err="1">
@@ -32188,8 +31827,77 @@
                 <a:effectLst/>
                 <a:latin typeface="Söhne"/>
               </a:rPr>
-              <a:t> Consult : 5,75 minutes.</a:t>
-            </a:r>
+              <a:t> Consult : 5,75 minutes</a:t>
+            </a:r>
+          </a:p>
+          <a:p>
+            <a:pPr marL="285750" indent="-285750">
+              <a:lnSpc>
+                <a:spcPct val="200000"/>
+              </a:lnSpc>
+              <a:buFont typeface="Arial" panose="020B0604020202020204" pitchFamily="34" charset="0"/>
+              <a:buChar char="•"/>
+            </a:pPr>
+            <a:r>
+              <a:rPr lang="fr-FR" b="1" dirty="0">
+                <a:latin typeface="Söhne"/>
+              </a:rPr>
+              <a:t>Economies</a:t>
+            </a:r>
+            <a:r>
+              <a:rPr lang="fr-FR" dirty="0">
+                <a:latin typeface="Söhne"/>
+              </a:rPr>
+              <a:t> potentielles:</a:t>
+            </a:r>
+          </a:p>
+          <a:p>
+            <a:pPr marL="742950" lvl="1" indent="-285750">
+              <a:lnSpc>
+                <a:spcPct val="200000"/>
+              </a:lnSpc>
+              <a:buFont typeface="Courier New" panose="02070309020205020404" pitchFamily="49" charset="0"/>
+              <a:buChar char="o"/>
+            </a:pPr>
+            <a:r>
+              <a:rPr lang="fr-FR" b="0" i="0" dirty="0">
+                <a:effectLst/>
+                <a:latin typeface="Söhne"/>
+              </a:rPr>
+              <a:t> 	            ~63.5h / an / infirmier</a:t>
+            </a:r>
+          </a:p>
+          <a:p>
+            <a:pPr marL="742950" lvl="1" indent="-285750">
+              <a:lnSpc>
+                <a:spcPct val="200000"/>
+              </a:lnSpc>
+              <a:buFont typeface="Courier New" panose="02070309020205020404" pitchFamily="49" charset="0"/>
+              <a:buChar char="o"/>
+            </a:pPr>
+            <a:r>
+              <a:rPr lang="fr-FR" dirty="0">
+                <a:latin typeface="Söhne"/>
+              </a:rPr>
+              <a:t> 	            2090€ / an / infirmier</a:t>
+            </a:r>
+            <a:endParaRPr lang="fr-FR" b="0" i="0" dirty="0">
+              <a:effectLst/>
+              <a:latin typeface="Söhne"/>
+            </a:endParaRPr>
+          </a:p>
+          <a:p>
+            <a:pPr marL="742950" lvl="1" indent="-285750">
+              <a:lnSpc>
+                <a:spcPct val="200000"/>
+              </a:lnSpc>
+              <a:buFont typeface="Arial" panose="020B0604020202020204" pitchFamily="34" charset="0"/>
+              <a:buChar char="•"/>
+            </a:pPr>
+            <a:endParaRPr lang="fr-FR" b="0" i="0" dirty="0">
+              <a:effectLst/>
+              <a:latin typeface="Söhne"/>
+            </a:endParaRPr>
           </a:p>
           <a:p>
             <a:pPr>
@@ -32216,13 +31924,13 @@
           <p:nvPr>
             <p:extLst>
               <p:ext uri="{D42A27DB-BD31-4B8C-83A1-F6EECF244321}">
-                <p14:modId xmlns:p14="http://schemas.microsoft.com/office/powerpoint/2010/main" val="741136899"/>
+                <p14:modId xmlns:p14="http://schemas.microsoft.com/office/powerpoint/2010/main" val="3703389276"/>
               </p:ext>
             </p:extLst>
           </p:nvPr>
         </p:nvGraphicFramePr>
         <p:xfrm>
-          <a:off x="6268819" y="1359219"/>
+          <a:off x="5944347" y="1690688"/>
           <a:ext cx="5396753" cy="4439088"/>
         </p:xfrm>
         <a:graphic>
@@ -32271,7 +31979,49 @@
                           <a:spcPts val="0"/>
                         </a:spcAft>
                       </a:pPr>
-                      <a:endParaRPr lang="it-IT" sz="1600" dirty="0">
+                      <a:endParaRPr lang="it-IT" sz="1600" u="none" dirty="0">
+                        <a:solidFill>
+                          <a:srgbClr val="000000"/>
+                        </a:solidFill>
+                        <a:effectLst/>
+                        <a:latin typeface="Arial" panose="020B0604020202020204" pitchFamily="34" charset="0"/>
+                        <a:ea typeface="Times New Roman" panose="02020603050405020304" pitchFamily="18" charset="0"/>
+                        <a:cs typeface="Times New Roman" panose="02020603050405020304" pitchFamily="18" charset="0"/>
+                      </a:endParaRPr>
+                    </a:p>
+                  </a:txBody>
+                  <a:tcPr marL="56232" marR="56232" marT="0" marB="0" anchor="ctr">
+                    <a:solidFill>
+                      <a:schemeClr val="accent1">
+                        <a:lumMod val="40000"/>
+                        <a:lumOff val="60000"/>
+                      </a:schemeClr>
+                    </a:solidFill>
+                  </a:tcPr>
+                </a:tc>
+                <a:tc>
+                  <a:txBody>
+                    <a:bodyPr/>
+                    <a:lstStyle/>
+                    <a:p>
+                      <a:pPr algn="ctr">
+                        <a:lnSpc>
+                          <a:spcPct val="100000"/>
+                        </a:lnSpc>
+                        <a:spcBef>
+                          <a:spcPts val="0"/>
+                        </a:spcBef>
+                        <a:spcAft>
+                          <a:spcPts val="0"/>
+                        </a:spcAft>
+                      </a:pPr>
+                      <a:r>
+                        <a:rPr lang="en-US" sz="1400" b="1" u="none">
+                          <a:effectLst/>
+                        </a:rPr>
+                        <a:t>Estimate</a:t>
+                      </a:r>
+                      <a:endParaRPr lang="it-IT" sz="1600" b="1" u="none">
                         <a:solidFill>
                           <a:srgbClr val="000000"/>
                         </a:solidFill>
@@ -32301,47 +32051,12 @@
                         </a:spcAft>
                       </a:pPr>
                       <a:r>
-                        <a:rPr lang="en-US" sz="1400">
-                          <a:effectLst/>
-                        </a:rPr>
-                        <a:t>Estimate</a:t>
-                      </a:r>
-                      <a:endParaRPr lang="it-IT" sz="1600">
-                        <a:solidFill>
-                          <a:srgbClr val="000000"/>
-                        </a:solidFill>
-                        <a:effectLst/>
-                        <a:latin typeface="Arial" panose="020B0604020202020204" pitchFamily="34" charset="0"/>
-                        <a:ea typeface="Times New Roman" panose="02020603050405020304" pitchFamily="18" charset="0"/>
-                        <a:cs typeface="Times New Roman" panose="02020603050405020304" pitchFamily="18" charset="0"/>
-                      </a:endParaRPr>
-                    </a:p>
-                  </a:txBody>
-                  <a:tcPr marL="56232" marR="56232" marT="0" marB="0" anchor="ctr"/>
-                </a:tc>
-                <a:tc>
-                  <a:txBody>
-                    <a:bodyPr/>
-                    <a:lstStyle/>
-                    <a:p>
-                      <a:pPr algn="ctr">
-                        <a:lnSpc>
-                          <a:spcPct val="100000"/>
-                        </a:lnSpc>
-                        <a:spcBef>
-                          <a:spcPts val="0"/>
-                        </a:spcBef>
-                        <a:spcAft>
-                          <a:spcPts val="0"/>
-                        </a:spcAft>
-                      </a:pPr>
-                      <a:r>
-                        <a:rPr lang="en-US" sz="1400">
+                        <a:rPr lang="en-US" sz="1400" b="0" u="none">
                           <a:effectLst/>
                         </a:rPr>
                         <a:t>95% CI</a:t>
                       </a:r>
-                      <a:endParaRPr lang="it-IT" sz="1600">
+                      <a:endParaRPr lang="it-IT" sz="1600" b="0" u="none">
                         <a:solidFill>
                           <a:srgbClr val="000000"/>
                         </a:solidFill>
@@ -32378,18 +32093,18 @@
                         </a:spcAft>
                       </a:pPr>
                       <a:r>
-                        <a:rPr lang="en-US" sz="1400" dirty="0" err="1">
+                        <a:rPr lang="en-US" sz="1400" u="none" dirty="0" err="1">
                           <a:effectLst/>
                         </a:rPr>
                         <a:t>Sénsibilité</a:t>
                       </a:r>
                       <a:r>
-                        <a:rPr lang="en-US" sz="1400" dirty="0">
+                        <a:rPr lang="en-US" sz="1400" u="none" dirty="0">
                           <a:effectLst/>
                         </a:rPr>
                         <a:t> (recall)</a:t>
                       </a:r>
-                      <a:endParaRPr lang="it-IT" sz="1600" dirty="0">
+                      <a:endParaRPr lang="it-IT" sz="1600" u="none" dirty="0">
                         <a:solidFill>
                           <a:srgbClr val="000000"/>
                         </a:solidFill>
@@ -32419,12 +32134,12 @@
                         </a:spcAft>
                       </a:pPr>
                       <a:r>
-                        <a:rPr lang="en-US" sz="1400" b="1" dirty="0">
+                        <a:rPr lang="en-US" sz="1400" b="1" u="none" dirty="0">
                           <a:effectLst/>
                         </a:rPr>
                         <a:t>0.82</a:t>
                       </a:r>
-                      <a:endParaRPr lang="it-IT" sz="1600" b="1" dirty="0">
+                      <a:endParaRPr lang="it-IT" sz="1600" b="1" u="none" dirty="0">
                         <a:solidFill>
                           <a:srgbClr val="000000"/>
                         </a:solidFill>
@@ -32454,12 +32169,12 @@
                         </a:spcAft>
                       </a:pPr>
                       <a:r>
-                        <a:rPr lang="en-US" sz="1400" dirty="0">
+                        <a:rPr lang="en-US" sz="1400" b="0" u="none" dirty="0">
                           <a:effectLst/>
                         </a:rPr>
                         <a:t>0.68, 0.92</a:t>
                       </a:r>
-                      <a:endParaRPr lang="it-IT" sz="1600" dirty="0">
+                      <a:endParaRPr lang="it-IT" sz="1600" b="0" u="none" dirty="0">
                         <a:solidFill>
                           <a:srgbClr val="000000"/>
                         </a:solidFill>
@@ -32496,12 +32211,12 @@
                         </a:spcAft>
                       </a:pPr>
                       <a:r>
-                        <a:rPr lang="en-US" sz="1400" dirty="0" err="1">
+                        <a:rPr lang="en-US" sz="1400" u="none" dirty="0" err="1">
                           <a:effectLst/>
                         </a:rPr>
                         <a:t>Spécificité</a:t>
                       </a:r>
-                      <a:endParaRPr lang="it-IT" sz="1600" dirty="0">
+                      <a:endParaRPr lang="it-IT" sz="1600" u="none" dirty="0">
                         <a:solidFill>
                           <a:srgbClr val="000000"/>
                         </a:solidFill>
@@ -32531,12 +32246,12 @@
                         </a:spcAft>
                       </a:pPr>
                       <a:r>
-                        <a:rPr lang="en-US" sz="1400" b="1" dirty="0">
+                        <a:rPr lang="en-US" sz="1600" b="1" u="none" dirty="0">
                           <a:effectLst/>
                         </a:rPr>
                         <a:t>0.98</a:t>
                       </a:r>
-                      <a:endParaRPr lang="it-IT" sz="1600" b="1" dirty="0">
+                      <a:endParaRPr lang="it-IT" sz="1600" b="1" u="none" dirty="0">
                         <a:solidFill>
                           <a:srgbClr val="000000"/>
                         </a:solidFill>
@@ -32566,12 +32281,12 @@
                         </a:spcAft>
                       </a:pPr>
                       <a:r>
-                        <a:rPr lang="en-US" sz="1400">
+                        <a:rPr lang="en-US" sz="1400" b="0" u="none">
                           <a:effectLst/>
                         </a:rPr>
                         <a:t>0.95, 0.99</a:t>
                       </a:r>
-                      <a:endParaRPr lang="it-IT" sz="1600">
+                      <a:endParaRPr lang="it-IT" sz="1600" b="0" u="none">
                         <a:solidFill>
                           <a:srgbClr val="000000"/>
                         </a:solidFill>
@@ -32608,12 +32323,12 @@
                         </a:spcAft>
                       </a:pPr>
                       <a:r>
-                        <a:rPr lang="en-US" sz="1400" dirty="0">
+                        <a:rPr lang="en-US" sz="1400" u="none" dirty="0">
                           <a:effectLst/>
                         </a:rPr>
                         <a:t>PPV (precision)</a:t>
                       </a:r>
-                      <a:endParaRPr lang="it-IT" sz="1600" dirty="0">
+                      <a:endParaRPr lang="it-IT" sz="1600" u="none" dirty="0">
                         <a:solidFill>
                           <a:srgbClr val="000000"/>
                         </a:solidFill>
@@ -32643,12 +32358,12 @@
                         </a:spcAft>
                       </a:pPr>
                       <a:r>
-                        <a:rPr lang="en-US" sz="1400">
+                        <a:rPr lang="en-US" sz="1400" b="1" u="none">
                           <a:effectLst/>
                         </a:rPr>
                         <a:t>0.86</a:t>
                       </a:r>
-                      <a:endParaRPr lang="it-IT" sz="1600">
+                      <a:endParaRPr lang="it-IT" sz="1600" b="1" u="none">
                         <a:solidFill>
                           <a:srgbClr val="000000"/>
                         </a:solidFill>
@@ -32678,12 +32393,12 @@
                         </a:spcAft>
                       </a:pPr>
                       <a:r>
-                        <a:rPr lang="en-US" sz="1400">
+                        <a:rPr lang="en-US" sz="1400" b="0" u="none">
                           <a:effectLst/>
                         </a:rPr>
                         <a:t>0.72, 0.95</a:t>
                       </a:r>
-                      <a:endParaRPr lang="it-IT" sz="1600">
+                      <a:endParaRPr lang="it-IT" sz="1600" b="0" u="none">
                         <a:solidFill>
                           <a:srgbClr val="000000"/>
                         </a:solidFill>
@@ -32720,12 +32435,12 @@
                         </a:spcAft>
                       </a:pPr>
                       <a:r>
-                        <a:rPr lang="en-US" sz="1400" dirty="0">
+                        <a:rPr lang="en-US" sz="1400" u="none" dirty="0">
                           <a:effectLst/>
                         </a:rPr>
                         <a:t>NPV</a:t>
                       </a:r>
-                      <a:endParaRPr lang="it-IT" sz="1600" dirty="0">
+                      <a:endParaRPr lang="it-IT" sz="1600" u="none" dirty="0">
                         <a:solidFill>
                           <a:srgbClr val="000000"/>
                         </a:solidFill>
@@ -32755,12 +32470,12 @@
                         </a:spcAft>
                       </a:pPr>
                       <a:r>
-                        <a:rPr lang="en-US" sz="1400">
+                        <a:rPr lang="en-US" sz="1600" b="1" u="none" dirty="0">
                           <a:effectLst/>
                         </a:rPr>
                         <a:t>0.97</a:t>
                       </a:r>
-                      <a:endParaRPr lang="it-IT" sz="1600">
+                      <a:endParaRPr lang="it-IT" sz="1600" b="1" u="none" dirty="0">
                         <a:solidFill>
                           <a:srgbClr val="000000"/>
                         </a:solidFill>
@@ -32790,12 +32505,12 @@
                         </a:spcAft>
                       </a:pPr>
                       <a:r>
-                        <a:rPr lang="en-US" sz="1400">
+                        <a:rPr lang="en-US" sz="1400" b="0" u="none">
                           <a:effectLst/>
                         </a:rPr>
                         <a:t>0.94, 0.99</a:t>
                       </a:r>
-                      <a:endParaRPr lang="it-IT" sz="1600">
+                      <a:endParaRPr lang="it-IT" sz="1600" b="0" u="none">
                         <a:solidFill>
                           <a:srgbClr val="000000"/>
                         </a:solidFill>
@@ -32832,12 +32547,30 @@
                         </a:spcAft>
                       </a:pPr>
                       <a:r>
-                        <a:rPr lang="en-US" sz="1400">
+                        <a:rPr lang="en-US" sz="1400" u="none" dirty="0">
                           <a:effectLst/>
                         </a:rPr>
-                        <a:t>F1-score</a:t>
+                        <a:t>Proportion </a:t>
                       </a:r>
-                      <a:endParaRPr lang="it-IT" sz="1600">
+                      <a:r>
+                        <a:rPr lang="en-US" sz="1400" u="none" dirty="0" err="1">
+                          <a:effectLst/>
+                        </a:rPr>
+                        <a:t>correctement</a:t>
+                      </a:r>
+                      <a:r>
+                        <a:rPr lang="en-US" sz="1400" u="none" dirty="0">
+                          <a:effectLst/>
+                        </a:rPr>
+                        <a:t> </a:t>
+                      </a:r>
+                      <a:r>
+                        <a:rPr lang="en-US" sz="1400" u="none" dirty="0" err="1">
+                          <a:effectLst/>
+                        </a:rPr>
+                        <a:t>classé</a:t>
+                      </a:r>
+                      <a:endParaRPr lang="it-IT" sz="1600" u="none" dirty="0">
                         <a:solidFill>
                           <a:srgbClr val="000000"/>
                         </a:solidFill>
@@ -32867,12 +32600,12 @@
                         </a:spcAft>
                       </a:pPr>
                       <a:r>
-                        <a:rPr lang="en-US" sz="1400" b="1" dirty="0">
+                        <a:rPr lang="en-US" sz="1600" b="1" u="none" dirty="0">
                           <a:effectLst/>
                         </a:rPr>
-                        <a:t>0.841</a:t>
+                        <a:t>0.95</a:t>
                       </a:r>
-                      <a:endParaRPr lang="it-IT" sz="1600" b="1" dirty="0">
+                      <a:endParaRPr lang="it-IT" sz="1600" b="1" u="none" dirty="0">
                         <a:solidFill>
                           <a:srgbClr val="000000"/>
                         </a:solidFill>
@@ -32902,12 +32635,124 @@
                         </a:spcAft>
                       </a:pPr>
                       <a:r>
-                        <a:rPr lang="en-US" sz="1600">
+                        <a:rPr lang="en-US" sz="1400" b="0" u="none" dirty="0">
+                          <a:effectLst/>
+                        </a:rPr>
+                        <a:t>0.92, 0.97</a:t>
+                      </a:r>
+                      <a:endParaRPr lang="it-IT" sz="1600" b="0" u="none" dirty="0">
+                        <a:solidFill>
+                          <a:srgbClr val="000000"/>
+                        </a:solidFill>
+                        <a:effectLst/>
+                        <a:latin typeface="Arial" panose="020B0604020202020204" pitchFamily="34" charset="0"/>
+                        <a:ea typeface="Times New Roman" panose="02020603050405020304" pitchFamily="18" charset="0"/>
+                        <a:cs typeface="Times New Roman" panose="02020603050405020304" pitchFamily="18" charset="0"/>
+                      </a:endParaRPr>
+                    </a:p>
+                  </a:txBody>
+                  <a:tcPr marL="56232" marR="56232" marT="0" marB="0" anchor="ctr"/>
+                </a:tc>
+                <a:extLst>
+                  <a:ext uri="{0D108BD9-81ED-4DB2-BD59-A6C34878D82A}">
+                    <a16:rowId xmlns:a16="http://schemas.microsoft.com/office/drawing/2014/main" val="4158317698"/>
+                  </a:ext>
+                </a:extLst>
+              </a:tr>
+              <a:tr h="554886">
+                <a:tc>
+                  <a:txBody>
+                    <a:bodyPr/>
+                    <a:lstStyle/>
+                    <a:p>
+                      <a:pPr algn="l">
+                        <a:lnSpc>
+                          <a:spcPct val="100000"/>
+                        </a:lnSpc>
+                        <a:spcBef>
+                          <a:spcPts val="0"/>
+                        </a:spcBef>
+                        <a:spcAft>
+                          <a:spcPts val="0"/>
+                        </a:spcAft>
+                      </a:pPr>
+                      <a:r>
+                        <a:rPr lang="en-US" sz="1400" u="none" dirty="0">
+                          <a:effectLst/>
+                        </a:rPr>
+                        <a:t>F1-score</a:t>
+                      </a:r>
+                      <a:endParaRPr lang="it-IT" sz="1600" u="none" dirty="0">
+                        <a:solidFill>
+                          <a:srgbClr val="000000"/>
+                        </a:solidFill>
+                        <a:effectLst/>
+                        <a:latin typeface="Arial" panose="020B0604020202020204" pitchFamily="34" charset="0"/>
+                        <a:ea typeface="Times New Roman" panose="02020603050405020304" pitchFamily="18" charset="0"/>
+                        <a:cs typeface="Times New Roman" panose="02020603050405020304" pitchFamily="18" charset="0"/>
+                      </a:endParaRPr>
+                    </a:p>
+                  </a:txBody>
+                  <a:tcPr marL="56232" marR="56232" marT="0" marB="0" anchor="ctr"/>
+                </a:tc>
+                <a:tc>
+                  <a:txBody>
+                    <a:bodyPr/>
+                    <a:lstStyle/>
+                    <a:p>
+                      <a:pPr algn="ctr">
+                        <a:lnSpc>
+                          <a:spcPct val="100000"/>
+                        </a:lnSpc>
+                        <a:spcBef>
+                          <a:spcPts val="0"/>
+                        </a:spcBef>
+                        <a:spcAft>
+                          <a:spcPts val="0"/>
+                        </a:spcAft>
+                      </a:pPr>
+                      <a:r>
+                        <a:rPr lang="en-US" sz="1400" b="1" u="none" dirty="0">
+                          <a:effectLst/>
+                        </a:rPr>
+                        <a:t>0.841</a:t>
+                      </a:r>
+                      <a:endParaRPr lang="it-IT" sz="1600" b="1" u="none" dirty="0">
+                        <a:solidFill>
+                          <a:srgbClr val="000000"/>
+                        </a:solidFill>
+                        <a:effectLst/>
+                        <a:latin typeface="Arial" panose="020B0604020202020204" pitchFamily="34" charset="0"/>
+                        <a:ea typeface="Times New Roman" panose="02020603050405020304" pitchFamily="18" charset="0"/>
+                        <a:cs typeface="Times New Roman" panose="02020603050405020304" pitchFamily="18" charset="0"/>
+                      </a:endParaRPr>
+                    </a:p>
+                  </a:txBody>
+                  <a:tcPr marL="56232" marR="56232" marT="0" marB="0" anchor="ctr"/>
+                </a:tc>
+                <a:tc>
+                  <a:txBody>
+                    <a:bodyPr/>
+                    <a:lstStyle/>
+                    <a:p>
+                      <a:pPr algn="ctr">
+                        <a:lnSpc>
+                          <a:spcPct val="100000"/>
+                        </a:lnSpc>
+                        <a:spcBef>
+                          <a:spcPts val="0"/>
+                        </a:spcBef>
+                        <a:spcAft>
+                          <a:spcPts val="0"/>
+                        </a:spcAft>
+                      </a:pPr>
+                      <a:r>
+                        <a:rPr lang="en-US" sz="1600" b="0" u="none">
                           <a:effectLst/>
                         </a:rPr>
                         <a:t> </a:t>
                       </a:r>
-                      <a:endParaRPr lang="it-IT" sz="1600">
+                      <a:endParaRPr lang="it-IT" sz="1600" b="0" u="none">
                         <a:solidFill>
                           <a:srgbClr val="000000"/>
                         </a:solidFill>
@@ -32944,12 +32789,12 @@
                         </a:spcAft>
                       </a:pPr>
                       <a:r>
-                        <a:rPr lang="en-US" sz="1400">
+                        <a:rPr lang="en-US" sz="1400" u="none" dirty="0">
                           <a:effectLst/>
                         </a:rPr>
                         <a:t>Matthews coefficient correlation</a:t>
                       </a:r>
-                      <a:endParaRPr lang="it-IT" sz="1600">
+                      <a:endParaRPr lang="it-IT" sz="1600" u="none" dirty="0">
                         <a:solidFill>
                           <a:srgbClr val="000000"/>
                         </a:solidFill>
@@ -32979,12 +32824,12 @@
                         </a:spcAft>
                       </a:pPr>
                       <a:r>
-                        <a:rPr lang="en-US" sz="1400" b="1" dirty="0">
+                        <a:rPr lang="en-US" sz="1400" b="1" u="none" dirty="0">
                           <a:effectLst/>
                         </a:rPr>
                         <a:t>0.814</a:t>
                       </a:r>
-                      <a:endParaRPr lang="it-IT" sz="1600" b="1" dirty="0">
+                      <a:endParaRPr lang="it-IT" sz="1600" b="1" u="none" dirty="0">
                         <a:solidFill>
                           <a:srgbClr val="000000"/>
                         </a:solidFill>
@@ -33014,12 +32859,12 @@
                         </a:spcAft>
                       </a:pPr>
                       <a:r>
-                        <a:rPr lang="en-US" sz="1600">
+                        <a:rPr lang="en-US" sz="1600" b="0" u="none" dirty="0">
                           <a:effectLst/>
                         </a:rPr>
                         <a:t> </a:t>
                       </a:r>
-                      <a:endParaRPr lang="it-IT" sz="1600">
+                      <a:endParaRPr lang="it-IT" sz="1600" b="0" u="none" dirty="0">
                         <a:solidFill>
                           <a:srgbClr val="000000"/>
                         </a:solidFill>
@@ -33038,330 +32883,87 @@
                   </a:ext>
                 </a:extLst>
               </a:tr>
-              <a:tr h="554886">
-                <a:tc>
-                  <a:txBody>
-                    <a:bodyPr/>
-                    <a:lstStyle/>
-                    <a:p>
-                      <a:pPr algn="l">
-                        <a:lnSpc>
-                          <a:spcPct val="100000"/>
-                        </a:lnSpc>
-                        <a:spcBef>
-                          <a:spcPts val="0"/>
-                        </a:spcBef>
-                        <a:spcAft>
-                          <a:spcPts val="0"/>
-                        </a:spcAft>
-                      </a:pPr>
-                      <a:r>
-                        <a:rPr lang="en-US" sz="1400" dirty="0">
-                          <a:effectLst/>
-                        </a:rPr>
-                        <a:t>Correctly classified proportion</a:t>
-                      </a:r>
-                      <a:endParaRPr lang="it-IT" sz="1600" dirty="0">
-                        <a:solidFill>
-                          <a:srgbClr val="000000"/>
-                        </a:solidFill>
-                        <a:effectLst/>
-                        <a:latin typeface="Arial" panose="020B0604020202020204" pitchFamily="34" charset="0"/>
-                        <a:ea typeface="Times New Roman" panose="02020603050405020304" pitchFamily="18" charset="0"/>
-                        <a:cs typeface="Times New Roman" panose="02020603050405020304" pitchFamily="18" charset="0"/>
-                      </a:endParaRPr>
-                    </a:p>
-                  </a:txBody>
-                  <a:tcPr marL="56232" marR="56232" marT="0" marB="0" anchor="ctr"/>
-                </a:tc>
-                <a:tc>
-                  <a:txBody>
-                    <a:bodyPr/>
-                    <a:lstStyle/>
-                    <a:p>
-                      <a:pPr algn="ctr">
-                        <a:lnSpc>
-                          <a:spcPct val="100000"/>
-                        </a:lnSpc>
-                        <a:spcBef>
-                          <a:spcPts val="0"/>
-                        </a:spcBef>
-                        <a:spcAft>
-                          <a:spcPts val="0"/>
-                        </a:spcAft>
-                      </a:pPr>
-                      <a:r>
-                        <a:rPr lang="en-US" sz="1400" dirty="0">
-                          <a:effectLst/>
-                        </a:rPr>
-                        <a:t>0.95</a:t>
-                      </a:r>
-                      <a:endParaRPr lang="it-IT" sz="1600" dirty="0">
-                        <a:solidFill>
-                          <a:srgbClr val="000000"/>
-                        </a:solidFill>
-                        <a:effectLst/>
-                        <a:latin typeface="Arial" panose="020B0604020202020204" pitchFamily="34" charset="0"/>
-                        <a:ea typeface="Times New Roman" panose="02020603050405020304" pitchFamily="18" charset="0"/>
-                        <a:cs typeface="Times New Roman" panose="02020603050405020304" pitchFamily="18" charset="0"/>
-                      </a:endParaRPr>
-                    </a:p>
-                  </a:txBody>
-                  <a:tcPr marL="56232" marR="56232" marT="0" marB="0" anchor="ctr"/>
-                </a:tc>
-                <a:tc>
-                  <a:txBody>
-                    <a:bodyPr/>
-                    <a:lstStyle/>
-                    <a:p>
-                      <a:pPr algn="ctr">
-                        <a:lnSpc>
-                          <a:spcPct val="100000"/>
-                        </a:lnSpc>
-                        <a:spcBef>
-                          <a:spcPts val="0"/>
-                        </a:spcBef>
-                        <a:spcAft>
-                          <a:spcPts val="0"/>
-                        </a:spcAft>
-                      </a:pPr>
-                      <a:r>
-                        <a:rPr lang="en-US" sz="1400" dirty="0">
-                          <a:effectLst/>
-                        </a:rPr>
-                        <a:t>0.92, 0.97</a:t>
-                      </a:r>
-                      <a:endParaRPr lang="it-IT" sz="1600" dirty="0">
-                        <a:solidFill>
-                          <a:srgbClr val="000000"/>
-                        </a:solidFill>
-                        <a:effectLst/>
-                        <a:latin typeface="Arial" panose="020B0604020202020204" pitchFamily="34" charset="0"/>
-                        <a:ea typeface="Times New Roman" panose="02020603050405020304" pitchFamily="18" charset="0"/>
-                        <a:cs typeface="Times New Roman" panose="02020603050405020304" pitchFamily="18" charset="0"/>
-                      </a:endParaRPr>
-                    </a:p>
-                  </a:txBody>
-                  <a:tcPr marL="56232" marR="56232" marT="0" marB="0" anchor="ctr"/>
-                </a:tc>
-                <a:extLst>
-                  <a:ext uri="{0D108BD9-81ED-4DB2-BD59-A6C34878D82A}">
-                    <a16:rowId xmlns:a16="http://schemas.microsoft.com/office/drawing/2014/main" val="1185660172"/>
-                  </a:ext>
-                </a:extLst>
-              </a:tr>
             </a:tbl>
           </a:graphicData>
         </a:graphic>
       </p:graphicFrame>
-      <p:sp>
-        <p:nvSpPr>
-          <p:cNvPr id="4" name="Rettangolo 3">
+      <p:pic>
+        <p:nvPicPr>
+          <p:cNvPr id="6" name="Segnaposto contenuto 4" descr="Cronometro">
             <a:extLst>
               <a:ext uri="{FF2B5EF4-FFF2-40B4-BE49-F238E27FC236}">
-                <a16:creationId xmlns:a16="http://schemas.microsoft.com/office/drawing/2014/main" id="{44BFD55A-2B9D-3D1F-DADA-D7BE7667B434}"/>
+                <a16:creationId xmlns:a16="http://schemas.microsoft.com/office/drawing/2014/main" id="{95D30E8B-AA74-FFCA-3762-34B1E6D4F00D}"/>
               </a:ext>
             </a:extLst>
           </p:cNvPr>
-          <p:cNvSpPr/>
-          <p:nvPr/>
-        </p:nvSpPr>
+          <p:cNvPicPr>
+            <a:picLocks noGrp="1" noChangeAspect="1"/>
+          </p:cNvPicPr>
+          <p:nvPr>
+            <p:ph idx="1"/>
+          </p:nvPr>
+        </p:nvPicPr>
+        <p:blipFill>
+          <a:blip r:embed="rId8">
+            <a:extLst>
+              <a:ext uri="{28A0092B-C50C-407E-A947-70E740481C1C}">
+                <a14:useLocalDpi xmlns:a14="http://schemas.microsoft.com/office/drawing/2010/main" val="0"/>
+              </a:ext>
+              <a:ext uri="{96DAC541-7B7A-43D3-8B79-37D633B846F1}">
+                <asvg:svgBlip xmlns:asvg="http://schemas.microsoft.com/office/drawing/2016/SVG/main" r:embed="rId9"/>
+              </a:ext>
+            </a:extLst>
+          </a:blip>
+          <a:stretch>
+            <a:fillRect/>
+          </a:stretch>
+        </p:blipFill>
         <p:spPr>
           <a:xfrm>
-            <a:off x="6285749" y="1915350"/>
-            <a:ext cx="4007723" cy="524496"/>
+            <a:off x="1468564" y="5061131"/>
+            <a:ext cx="565317" cy="565317"/>
+          </a:xfrm>
+        </p:spPr>
+      </p:pic>
+      <p:pic>
+        <p:nvPicPr>
+          <p:cNvPr id="9" name="Elemento grafico 8" descr="Monete">
+            <a:extLst>
+              <a:ext uri="{FF2B5EF4-FFF2-40B4-BE49-F238E27FC236}">
+                <a16:creationId xmlns:a16="http://schemas.microsoft.com/office/drawing/2014/main" id="{78959A47-9BAE-E285-1ACA-4755AD5ADC4E}"/>
+              </a:ext>
+            </a:extLst>
+          </p:cNvPr>
+          <p:cNvPicPr>
+            <a:picLocks noChangeAspect="1"/>
+          </p:cNvPicPr>
+          <p:nvPr/>
+        </p:nvPicPr>
+        <p:blipFill>
+          <a:blip r:embed="rId10">
+            <a:extLst>
+              <a:ext uri="{28A0092B-C50C-407E-A947-70E740481C1C}">
+                <a14:useLocalDpi xmlns:a14="http://schemas.microsoft.com/office/drawing/2010/main" val="0"/>
+              </a:ext>
+              <a:ext uri="{96DAC541-7B7A-43D3-8B79-37D633B846F1}">
+                <asvg:svgBlip xmlns:asvg="http://schemas.microsoft.com/office/drawing/2016/SVG/main" r:embed="rId11"/>
+              </a:ext>
+            </a:extLst>
+          </a:blip>
+          <a:stretch>
+            <a:fillRect/>
+          </a:stretch>
+        </p:blipFill>
+        <p:spPr>
+          <a:xfrm>
+            <a:off x="1471906" y="5626448"/>
+            <a:ext cx="561975" cy="561975"/>
           </a:xfrm>
           <a:prstGeom prst="rect">
             <a:avLst/>
           </a:prstGeom>
-          <a:noFill/>
-          <a:ln w="28575">
-            <a:solidFill>
-              <a:srgbClr val="FF0000"/>
-            </a:solidFill>
-          </a:ln>
         </p:spPr>
-        <p:style>
-          <a:lnRef idx="2">
-            <a:schemeClr val="accent1">
-              <a:shade val="15000"/>
-            </a:schemeClr>
-          </a:lnRef>
-          <a:fillRef idx="1">
-            <a:schemeClr val="accent1"/>
-          </a:fillRef>
-          <a:effectRef idx="0">
-            <a:schemeClr val="accent1"/>
-          </a:effectRef>
-          <a:fontRef idx="minor">
-            <a:schemeClr val="lt1"/>
-          </a:fontRef>
-        </p:style>
-        <p:txBody>
-          <a:bodyPr rtlCol="0" anchor="ctr"/>
-          <a:lstStyle/>
-          <a:p>
-            <a:pPr algn="ctr"/>
-            <a:endParaRPr lang="it-IT"/>
-          </a:p>
-        </p:txBody>
-      </p:sp>
-      <p:sp>
-        <p:nvSpPr>
-          <p:cNvPr id="11" name="Rettangolo 10">
-            <a:extLst>
-              <a:ext uri="{FF2B5EF4-FFF2-40B4-BE49-F238E27FC236}">
-                <a16:creationId xmlns:a16="http://schemas.microsoft.com/office/drawing/2014/main" id="{E9E35416-B4A4-B878-A0EE-7F80098A9AC9}"/>
-              </a:ext>
-            </a:extLst>
-          </p:cNvPr>
-          <p:cNvSpPr/>
-          <p:nvPr/>
-        </p:nvSpPr>
-        <p:spPr>
-          <a:xfrm>
-            <a:off x="6285749" y="2456255"/>
-            <a:ext cx="4007723" cy="557315"/>
-          </a:xfrm>
-          <a:prstGeom prst="rect">
-            <a:avLst/>
-          </a:prstGeom>
-          <a:noFill/>
-          <a:ln w="28575">
-            <a:solidFill>
-              <a:srgbClr val="FF0000"/>
-            </a:solidFill>
-          </a:ln>
-        </p:spPr>
-        <p:style>
-          <a:lnRef idx="2">
-            <a:schemeClr val="accent1">
-              <a:shade val="15000"/>
-            </a:schemeClr>
-          </a:lnRef>
-          <a:fillRef idx="1">
-            <a:schemeClr val="accent1"/>
-          </a:fillRef>
-          <a:effectRef idx="0">
-            <a:schemeClr val="accent1"/>
-          </a:effectRef>
-          <a:fontRef idx="minor">
-            <a:schemeClr val="lt1"/>
-          </a:fontRef>
-        </p:style>
-        <p:txBody>
-          <a:bodyPr rtlCol="0" anchor="ctr"/>
-          <a:lstStyle/>
-          <a:p>
-            <a:pPr algn="ctr"/>
-            <a:endParaRPr lang="it-IT"/>
-          </a:p>
-        </p:txBody>
-      </p:sp>
-      <p:sp>
-        <p:nvSpPr>
-          <p:cNvPr id="12" name="Rettangolo 11">
-            <a:extLst>
-              <a:ext uri="{FF2B5EF4-FFF2-40B4-BE49-F238E27FC236}">
-                <a16:creationId xmlns:a16="http://schemas.microsoft.com/office/drawing/2014/main" id="{7ABA320C-5A7C-353D-3D5F-FC9A94CEE414}"/>
-              </a:ext>
-            </a:extLst>
-          </p:cNvPr>
-          <p:cNvSpPr/>
-          <p:nvPr/>
-        </p:nvSpPr>
-        <p:spPr>
-          <a:xfrm>
-            <a:off x="6285749" y="4123352"/>
-            <a:ext cx="4007723" cy="557315"/>
-          </a:xfrm>
-          <a:prstGeom prst="rect">
-            <a:avLst/>
-          </a:prstGeom>
-          <a:noFill/>
-          <a:ln w="28575">
-            <a:solidFill>
-              <a:srgbClr val="FF0000"/>
-            </a:solidFill>
-          </a:ln>
-        </p:spPr>
-        <p:style>
-          <a:lnRef idx="2">
-            <a:schemeClr val="accent1">
-              <a:shade val="15000"/>
-            </a:schemeClr>
-          </a:lnRef>
-          <a:fillRef idx="1">
-            <a:schemeClr val="accent1"/>
-          </a:fillRef>
-          <a:effectRef idx="0">
-            <a:schemeClr val="accent1"/>
-          </a:effectRef>
-          <a:fontRef idx="minor">
-            <a:schemeClr val="lt1"/>
-          </a:fontRef>
-        </p:style>
-        <p:txBody>
-          <a:bodyPr rtlCol="0" anchor="ctr"/>
-          <a:lstStyle/>
-          <a:p>
-            <a:pPr algn="ctr"/>
-            <a:endParaRPr lang="it-IT"/>
-          </a:p>
-        </p:txBody>
-      </p:sp>
-      <p:sp>
-        <p:nvSpPr>
-          <p:cNvPr id="13" name="Rettangolo 12">
-            <a:extLst>
-              <a:ext uri="{FF2B5EF4-FFF2-40B4-BE49-F238E27FC236}">
-                <a16:creationId xmlns:a16="http://schemas.microsoft.com/office/drawing/2014/main" id="{88B5D77B-E2D6-2183-367F-57C9429F7A65}"/>
-              </a:ext>
-            </a:extLst>
-          </p:cNvPr>
-          <p:cNvSpPr/>
-          <p:nvPr/>
-        </p:nvSpPr>
-        <p:spPr>
-          <a:xfrm>
-            <a:off x="6285749" y="4680667"/>
-            <a:ext cx="4007723" cy="557315"/>
-          </a:xfrm>
-          <a:prstGeom prst="rect">
-            <a:avLst/>
-          </a:prstGeom>
-          <a:noFill/>
-          <a:ln w="28575">
-            <a:solidFill>
-              <a:srgbClr val="FF0000"/>
-            </a:solidFill>
-          </a:ln>
-        </p:spPr>
-        <p:style>
-          <a:lnRef idx="2">
-            <a:schemeClr val="accent1">
-              <a:shade val="15000"/>
-            </a:schemeClr>
-          </a:lnRef>
-          <a:fillRef idx="1">
-            <a:schemeClr val="accent1"/>
-          </a:fillRef>
-          <a:effectRef idx="0">
-            <a:schemeClr val="accent1"/>
-          </a:effectRef>
-          <a:fontRef idx="minor">
-            <a:schemeClr val="lt1"/>
-          </a:fontRef>
-        </p:style>
-        <p:txBody>
-          <a:bodyPr rtlCol="0" anchor="ctr"/>
-          <a:lstStyle/>
-          <a:p>
-            <a:pPr algn="ctr"/>
-            <a:endParaRPr lang="it-IT"/>
-          </a:p>
-        </p:txBody>
-      </p:sp>
+      </p:pic>
     </p:spTree>
     <p:extLst>
       <p:ext uri="{BB962C8B-B14F-4D97-AF65-F5344CB8AC3E}">
@@ -33458,297 +33060,6 @@
       </p:graphicFrame>
       <p:sp>
         <p:nvSpPr>
-          <p:cNvPr id="3" name="Rectangle 2"/>
-          <p:cNvSpPr/>
-          <p:nvPr/>
-        </p:nvSpPr>
-        <p:spPr>
-          <a:xfrm>
-            <a:off x="11037047" y="-1448633"/>
-            <a:ext cx="10818906" cy="3139321"/>
-          </a:xfrm>
-          <a:prstGeom prst="rect">
-            <a:avLst/>
-          </a:prstGeom>
-        </p:spPr>
-        <p:txBody>
-          <a:bodyPr wrap="square">
-            <a:spAutoFit/>
-          </a:bodyPr>
-          <a:lstStyle/>
-          <a:p>
-            <a:pPr marL="285750" indent="-285750">
-              <a:buFont typeface="Arial" panose="020B0604020202020204" pitchFamily="34" charset="0"/>
-              <a:buChar char="•"/>
-            </a:pPr>
-            <a:r>
-              <a:rPr lang="fr-FR" dirty="0">
-                <a:latin typeface="Söhne"/>
-                <a:ea typeface="Roboto" panose="02000000000000000000" pitchFamily="2" charset="0"/>
-              </a:rPr>
-              <a:t>Considéré que l'algo est sensé être un appui, il présente un bon équilibre entre sensibilité et spécificité. Il identifie la plus part des ISO qui peuvent en suite être confirmées très rapidement</a:t>
-            </a:r>
-          </a:p>
-          <a:p>
-            <a:pPr marL="285750" indent="-285750">
-              <a:buFont typeface="Arial" panose="020B0604020202020204" pitchFamily="34" charset="0"/>
-              <a:buChar char="•"/>
-            </a:pPr>
-            <a:r>
-              <a:rPr lang="fr-FR" dirty="0">
-                <a:latin typeface="Söhne"/>
-                <a:ea typeface="Roboto" panose="02000000000000000000" pitchFamily="2" charset="0"/>
-              </a:rPr>
-              <a:t>Les gains en temps estimés sont </a:t>
-            </a:r>
-            <a:r>
-              <a:rPr lang="fr-FR" dirty="0" err="1">
-                <a:latin typeface="Söhne"/>
-                <a:ea typeface="Roboto" panose="02000000000000000000" pitchFamily="2" charset="0"/>
-              </a:rPr>
-              <a:t>sont</a:t>
-            </a:r>
-            <a:r>
-              <a:rPr lang="fr-FR" dirty="0">
-                <a:latin typeface="Söhne"/>
-                <a:ea typeface="Roboto" panose="02000000000000000000" pitchFamily="2" charset="0"/>
-              </a:rPr>
-              <a:t> substantiels:</a:t>
-            </a:r>
-          </a:p>
-          <a:p>
-            <a:pPr marL="742950" lvl="1" indent="-285750">
-              <a:buFont typeface="Arial" panose="020B0604020202020204" pitchFamily="34" charset="0"/>
-              <a:buChar char="•"/>
-            </a:pPr>
-            <a:r>
-              <a:rPr lang="fr-FR" dirty="0">
-                <a:latin typeface="Söhne"/>
-                <a:ea typeface="Roboto" panose="02000000000000000000" pitchFamily="2" charset="0"/>
-              </a:rPr>
-              <a:t>~63.5h par an, par infirmier + le temps </a:t>
-            </a:r>
-            <a:r>
-              <a:rPr lang="fr-FR" dirty="0" err="1">
-                <a:latin typeface="Söhne"/>
-                <a:ea typeface="Roboto" panose="02000000000000000000" pitchFamily="2" charset="0"/>
-              </a:rPr>
-              <a:t>che</a:t>
-            </a:r>
-            <a:r>
-              <a:rPr lang="fr-FR" dirty="0">
-                <a:latin typeface="Söhne"/>
-                <a:ea typeface="Roboto" panose="02000000000000000000" pitchFamily="2" charset="0"/>
-              </a:rPr>
-              <a:t> </a:t>
-            </a:r>
-            <a:r>
-              <a:rPr lang="fr-FR" dirty="0" err="1">
-                <a:latin typeface="Söhne"/>
-                <a:ea typeface="Roboto" panose="02000000000000000000" pitchFamily="2" charset="0"/>
-              </a:rPr>
-              <a:t>gli</a:t>
-            </a:r>
-            <a:r>
-              <a:rPr lang="fr-FR" dirty="0">
-                <a:latin typeface="Söhne"/>
-                <a:ea typeface="Roboto" panose="02000000000000000000" pitchFamily="2" charset="0"/>
-              </a:rPr>
-              <a:t> </a:t>
-            </a:r>
-            <a:r>
-              <a:rPr lang="fr-FR" dirty="0" err="1">
-                <a:latin typeface="Söhne"/>
-                <a:ea typeface="Roboto" panose="02000000000000000000" pitchFamily="2" charset="0"/>
-              </a:rPr>
-              <a:t>altri</a:t>
-            </a:r>
-            <a:r>
-              <a:rPr lang="fr-FR" dirty="0">
-                <a:latin typeface="Söhne"/>
-                <a:ea typeface="Roboto" panose="02000000000000000000" pitchFamily="2" charset="0"/>
-              </a:rPr>
-              <a:t> non </a:t>
-            </a:r>
-            <a:r>
-              <a:rPr lang="fr-FR" dirty="0" err="1">
-                <a:latin typeface="Söhne"/>
-                <a:ea typeface="Roboto" panose="02000000000000000000" pitchFamily="2" charset="0"/>
-              </a:rPr>
-              <a:t>glid</a:t>
-            </a:r>
-            <a:r>
-              <a:rPr lang="fr-FR" dirty="0">
-                <a:latin typeface="Söhne"/>
-                <a:ea typeface="Roboto" panose="02000000000000000000" pitchFamily="2" charset="0"/>
-              </a:rPr>
-              <a:t> </a:t>
-            </a:r>
-            <a:r>
-              <a:rPr lang="fr-FR" dirty="0" err="1">
-                <a:latin typeface="Söhne"/>
-                <a:ea typeface="Roboto" panose="02000000000000000000" pitchFamily="2" charset="0"/>
-              </a:rPr>
-              <a:t>edicano</a:t>
-            </a:r>
-            <a:r>
-              <a:rPr lang="fr-FR" dirty="0">
-                <a:latin typeface="Söhne"/>
-                <a:ea typeface="Roboto" panose="02000000000000000000" pitchFamily="2" charset="0"/>
-              </a:rPr>
-              <a:t> più</a:t>
-            </a:r>
-          </a:p>
-          <a:p>
-            <a:pPr marL="285750" indent="-285750">
-              <a:buFont typeface="Arial" panose="020B0604020202020204" pitchFamily="34" charset="0"/>
-              <a:buChar char="•"/>
-            </a:pPr>
-            <a:r>
-              <a:rPr lang="it-IT" dirty="0">
-                <a:latin typeface="Söhne"/>
-                <a:ea typeface="Roboto" panose="02000000000000000000" pitchFamily="2" charset="0"/>
-              </a:rPr>
-              <a:t>Il guadagno in cash è poca roba nel contesto dell’ospedale ma ogni cosa conta</a:t>
-            </a:r>
-            <a:endParaRPr lang="fr-FR" dirty="0">
-              <a:latin typeface="Söhne"/>
-              <a:ea typeface="Roboto" panose="02000000000000000000" pitchFamily="2" charset="0"/>
-            </a:endParaRPr>
-          </a:p>
-          <a:p>
-            <a:pPr marL="285750" indent="-285750">
-              <a:buFont typeface="Arial" panose="020B0604020202020204" pitchFamily="34" charset="0"/>
-              <a:buChar char="•"/>
-            </a:pPr>
-            <a:r>
-              <a:rPr lang="fr-FR" dirty="0">
-                <a:latin typeface="Söhne"/>
-                <a:ea typeface="Roboto" panose="02000000000000000000" pitchFamily="2" charset="0"/>
-              </a:rPr>
-              <a:t>L’</a:t>
-            </a:r>
-            <a:r>
-              <a:rPr lang="fr-FR" dirty="0" err="1">
-                <a:latin typeface="Söhne"/>
-                <a:ea typeface="Roboto" panose="02000000000000000000" pitchFamily="2" charset="0"/>
-              </a:rPr>
-              <a:t>algoritmo</a:t>
-            </a:r>
-            <a:r>
-              <a:rPr lang="fr-FR" dirty="0">
-                <a:latin typeface="Söhne"/>
-                <a:ea typeface="Roboto" panose="02000000000000000000" pitchFamily="2" charset="0"/>
-              </a:rPr>
-              <a:t> </a:t>
-            </a:r>
-            <a:r>
-              <a:rPr lang="fr-FR" dirty="0" err="1">
-                <a:latin typeface="Söhne"/>
-                <a:ea typeface="Roboto" panose="02000000000000000000" pitchFamily="2" charset="0"/>
-              </a:rPr>
-              <a:t>estende</a:t>
-            </a:r>
-            <a:r>
-              <a:rPr lang="fr-FR" dirty="0">
-                <a:latin typeface="Söhne"/>
-                <a:ea typeface="Roboto" panose="02000000000000000000" pitchFamily="2" charset="0"/>
-              </a:rPr>
-              <a:t> la </a:t>
-            </a:r>
-            <a:r>
-              <a:rPr lang="fr-FR" dirty="0" err="1">
-                <a:latin typeface="Söhne"/>
-                <a:ea typeface="Roboto" panose="02000000000000000000" pitchFamily="2" charset="0"/>
-              </a:rPr>
-              <a:t>sorveglianza</a:t>
-            </a:r>
-            <a:r>
-              <a:rPr lang="fr-FR" dirty="0">
-                <a:latin typeface="Söhne"/>
-                <a:ea typeface="Roboto" panose="02000000000000000000" pitchFamily="2" charset="0"/>
-              </a:rPr>
-              <a:t> a tutti i </a:t>
-            </a:r>
-            <a:r>
-              <a:rPr lang="fr-FR" dirty="0" err="1">
-                <a:latin typeface="Söhne"/>
-                <a:ea typeface="Roboto" panose="02000000000000000000" pitchFamily="2" charset="0"/>
-              </a:rPr>
-              <a:t>servizi</a:t>
-            </a:r>
-            <a:endParaRPr lang="fr-FR" dirty="0">
-              <a:latin typeface="Söhne"/>
-              <a:ea typeface="Roboto" panose="02000000000000000000" pitchFamily="2" charset="0"/>
-            </a:endParaRPr>
-          </a:p>
-          <a:p>
-            <a:pPr marL="285750" indent="-285750">
-              <a:buFont typeface="Arial" panose="020B0604020202020204" pitchFamily="34" charset="0"/>
-              <a:buChar char="•"/>
-            </a:pPr>
-            <a:endParaRPr lang="it-IT" dirty="0">
-              <a:latin typeface="Söhne"/>
-              <a:ea typeface="Roboto" panose="02000000000000000000" pitchFamily="2" charset="0"/>
-            </a:endParaRPr>
-          </a:p>
-          <a:p>
-            <a:pPr marL="285750" indent="-285750">
-              <a:buFont typeface="Arial" panose="020B0604020202020204" pitchFamily="34" charset="0"/>
-              <a:buChar char="•"/>
-            </a:pPr>
-            <a:endParaRPr lang="it-IT" dirty="0">
-              <a:latin typeface="Söhne"/>
-              <a:ea typeface="Roboto" panose="02000000000000000000" pitchFamily="2" charset="0"/>
-            </a:endParaRPr>
-          </a:p>
-          <a:p>
-            <a:pPr marL="285750" indent="-285750">
-              <a:buFont typeface="Arial" panose="020B0604020202020204" pitchFamily="34" charset="0"/>
-              <a:buChar char="•"/>
-            </a:pPr>
-            <a:r>
-              <a:rPr lang="it-IT" dirty="0">
-                <a:latin typeface="Söhne"/>
-                <a:ea typeface="Roboto" panose="02000000000000000000" pitchFamily="2" charset="0"/>
-              </a:rPr>
-              <a:t>Sensibilità buona ma non ottima:</a:t>
-            </a:r>
-          </a:p>
-          <a:p>
-            <a:pPr marL="742950" lvl="1" indent="-285750">
-              <a:buFont typeface="Arial" panose="020B0604020202020204" pitchFamily="34" charset="0"/>
-              <a:buChar char="•"/>
-            </a:pPr>
-            <a:r>
-              <a:rPr lang="en-US" dirty="0">
-                <a:latin typeface="Söhne"/>
-                <a:ea typeface="Roboto" panose="02000000000000000000" pitchFamily="2" charset="0"/>
-              </a:rPr>
-              <a:t>clinicians may use vague terminology, either inadvertently or being reluctant to document complications</a:t>
-            </a:r>
-          </a:p>
-          <a:p>
-            <a:pPr marL="742950" lvl="1" indent="-285750">
-              <a:buFont typeface="Arial" panose="020B0604020202020204" pitchFamily="34" charset="0"/>
-              <a:buChar char="•"/>
-            </a:pPr>
-            <a:r>
-              <a:rPr lang="en-US" dirty="0">
-                <a:latin typeface="Söhne"/>
-                <a:ea typeface="Roboto" panose="02000000000000000000" pitchFamily="2" charset="0"/>
-              </a:rPr>
-              <a:t>NO gold standard from the hygiene department for year 2020 to compare to</a:t>
-            </a:r>
-            <a:endParaRPr lang="fr-FR" dirty="0">
-              <a:latin typeface="Söhne"/>
-              <a:ea typeface="Roboto" panose="02000000000000000000" pitchFamily="2" charset="0"/>
-            </a:endParaRPr>
-          </a:p>
-        </p:txBody>
-      </p:sp>
-      <p:sp>
-        <p:nvSpPr>
           <p:cNvPr id="5" name="CasellaDiTesto 4">
             <a:extLst>
               <a:ext uri="{FF2B5EF4-FFF2-40B4-BE49-F238E27FC236}">
@@ -33761,8 +33072,8 @@
         </p:nvSpPr>
         <p:spPr>
           <a:xfrm>
-            <a:off x="534894" y="1916817"/>
-            <a:ext cx="10818906" cy="4204356"/>
+            <a:off x="534894" y="1828643"/>
+            <a:ext cx="5561106" cy="4508285"/>
           </a:xfrm>
           <a:prstGeom prst="rect">
             <a:avLst/>
@@ -33777,195 +33088,322 @@
           <a:p>
             <a:pPr algn="l">
               <a:lnSpc>
-                <a:spcPct val="150000"/>
+                <a:spcPct val="200000"/>
               </a:lnSpc>
+            </a:pPr>
+            <a:r>
+              <a:rPr lang="fr-FR" sz="2000" b="1" i="0" dirty="0">
+                <a:effectLst/>
+                <a:latin typeface="Söhne"/>
+              </a:rPr>
+              <a:t>Points Forts</a:t>
+            </a:r>
+          </a:p>
+          <a:p>
+            <a:pPr marL="285750" indent="-285750" algn="l">
+              <a:lnSpc>
+                <a:spcPct val="200000"/>
+              </a:lnSpc>
+              <a:buFont typeface="Arial" panose="020B0604020202020204" pitchFamily="34" charset="0"/>
+              <a:buChar char="•"/>
+            </a:pPr>
+            <a:r>
+              <a:rPr lang="fr-FR" i="0" dirty="0">
+                <a:effectLst/>
+                <a:latin typeface="Söhne"/>
+              </a:rPr>
+              <a:t>Bonne performance globale</a:t>
+            </a:r>
+          </a:p>
+          <a:p>
+            <a:pPr marL="285750" indent="-285750" algn="l">
+              <a:lnSpc>
+                <a:spcPct val="200000"/>
+              </a:lnSpc>
+              <a:buFont typeface="Arial" panose="020B0604020202020204" pitchFamily="34" charset="0"/>
+              <a:buChar char="•"/>
             </a:pPr>
             <a:r>
               <a:rPr lang="fr-FR" b="1" i="0" dirty="0">
                 <a:effectLst/>
                 <a:latin typeface="Söhne"/>
               </a:rPr>
-              <a:t>Points Forts</a:t>
+              <a:t> 	-</a:t>
+            </a:r>
+            <a:r>
+              <a:rPr lang="fr-FR" b="0" i="0" dirty="0">
+                <a:effectLst/>
+                <a:latin typeface="Söhne"/>
+              </a:rPr>
+              <a:t>64,5% 		</a:t>
             </a:r>
           </a:p>
           <a:p>
             <a:pPr marL="285750" indent="-285750" algn="l">
               <a:lnSpc>
-                <a:spcPct val="150000"/>
+                <a:spcPct val="200000"/>
               </a:lnSpc>
               <a:buFont typeface="Arial" panose="020B0604020202020204" pitchFamily="34" charset="0"/>
               <a:buChar char="•"/>
             </a:pPr>
             <a:r>
+              <a:rPr lang="fr-FR" b="0" i="0" dirty="0">
+                <a:effectLst/>
+                <a:latin typeface="Söhne"/>
+              </a:rPr>
+              <a:t>	</a:t>
+            </a:r>
+            <a:r>
               <a:rPr lang="fr-FR" b="1" i="0" dirty="0">
                 <a:effectLst/>
                 <a:latin typeface="Söhne"/>
               </a:rPr>
-              <a:t>Efficacité et Précision</a:t>
+              <a:t>-</a:t>
             </a:r>
             <a:r>
               <a:rPr lang="fr-FR" b="0" i="0" dirty="0">
                 <a:effectLst/>
                 <a:latin typeface="Söhne"/>
               </a:rPr>
-              <a:t>: L'algorithme a une spécificité de 98% et une sensibilité de 82%.</a:t>
+              <a:t>2090€ / an / infirmier dédié</a:t>
             </a:r>
           </a:p>
           <a:p>
             <a:pPr marL="285750" indent="-285750" algn="l">
               <a:lnSpc>
-                <a:spcPct val="150000"/>
+                <a:spcPct val="200000"/>
               </a:lnSpc>
               <a:buFont typeface="Arial" panose="020B0604020202020204" pitchFamily="34" charset="0"/>
               <a:buChar char="•"/>
             </a:pPr>
             <a:r>
-              <a:rPr lang="fr-FR" b="1" i="0" dirty="0">
-                <a:effectLst/>
-                <a:latin typeface="Söhne"/>
-              </a:rPr>
-              <a:t>Gain de Temps</a:t>
-            </a:r>
-            <a:r>
               <a:rPr lang="fr-FR" b="0" i="0" dirty="0">
                 <a:effectLst/>
                 <a:latin typeface="Söhne"/>
               </a:rPr>
-              <a:t>: Réduction du temps de surveillance des ISI de 64,5% par infirmier par an.</a:t>
-            </a:r>
+              <a:t>Surveillance élargie à toutes les UM</a:t>
+            </a:r>
+          </a:p>
+          <a:p>
+            <a:pPr marL="285750" indent="-285750">
+              <a:lnSpc>
+                <a:spcPct val="200000"/>
+              </a:lnSpc>
+              <a:buFont typeface="Arial" panose="020B0604020202020204" pitchFamily="34" charset="0"/>
+              <a:buChar char="•"/>
+            </a:pPr>
+            <a:r>
+              <a:rPr lang="fr-FR" b="0" i="0" dirty="0">
+                <a:effectLst/>
+                <a:latin typeface="Söhne"/>
+              </a:rPr>
+              <a:t>Facilement adaptable à d’autres contextes</a:t>
+            </a:r>
+          </a:p>
+          <a:p>
+            <a:pPr marL="285750" indent="-285750">
+              <a:lnSpc>
+                <a:spcPct val="200000"/>
+              </a:lnSpc>
+              <a:buFont typeface="Arial" panose="020B0604020202020204" pitchFamily="34" charset="0"/>
+              <a:buChar char="•"/>
+            </a:pPr>
+            <a:r>
+              <a:rPr lang="fr-FR" dirty="0">
+                <a:latin typeface="Söhne"/>
+              </a:rPr>
+              <a:t>↑ </a:t>
+            </a:r>
+            <a:r>
+              <a:rPr lang="fr-FR" dirty="0" err="1">
+                <a:latin typeface="Söhne"/>
+              </a:rPr>
+              <a:t>QoL</a:t>
+            </a:r>
+            <a:r>
+              <a:rPr lang="fr-FR" dirty="0">
+                <a:latin typeface="Söhne"/>
+              </a:rPr>
+              <a:t> : NO déplacement, NO </a:t>
+            </a:r>
+            <a:r>
+              <a:rPr lang="fr-FR" dirty="0" err="1">
+                <a:latin typeface="Söhne"/>
+              </a:rPr>
+              <a:t>dépendence</a:t>
+            </a:r>
+            <a:r>
+              <a:rPr lang="fr-FR" dirty="0">
+                <a:latin typeface="Söhne"/>
+              </a:rPr>
+              <a:t> des autres</a:t>
+            </a:r>
+          </a:p>
+          <a:p>
+            <a:pPr marL="285750" indent="-285750">
+              <a:lnSpc>
+                <a:spcPct val="200000"/>
+              </a:lnSpc>
+              <a:buFont typeface="Arial" panose="020B0604020202020204" pitchFamily="34" charset="0"/>
+              <a:buChar char="•"/>
+            </a:pPr>
+            <a:r>
+              <a:rPr lang="fr-FR" dirty="0">
+                <a:latin typeface="Söhne"/>
+              </a:rPr>
+              <a:t>↑ transparence </a:t>
+            </a:r>
+            <a:endParaRPr lang="fr-FR" b="0" i="0" dirty="0">
+              <a:effectLst/>
+              <a:latin typeface="Söhne"/>
+            </a:endParaRPr>
+          </a:p>
+        </p:txBody>
+      </p:sp>
+      <p:pic>
+        <p:nvPicPr>
+          <p:cNvPr id="4" name="Segnaposto contenuto 4" descr="Cronometro">
+            <a:extLst>
+              <a:ext uri="{FF2B5EF4-FFF2-40B4-BE49-F238E27FC236}">
+                <a16:creationId xmlns:a16="http://schemas.microsoft.com/office/drawing/2014/main" id="{FE214D64-E35E-7A00-825B-C25774E8B461}"/>
+              </a:ext>
+            </a:extLst>
+          </p:cNvPr>
+          <p:cNvPicPr>
+            <a:picLocks noGrp="1" noChangeAspect="1"/>
+          </p:cNvPicPr>
+          <p:nvPr>
+            <p:ph idx="1"/>
+          </p:nvPr>
+        </p:nvPicPr>
+        <p:blipFill>
+          <a:blip r:embed="rId8">
+            <a:extLst>
+              <a:ext uri="{28A0092B-C50C-407E-A947-70E740481C1C}">
+                <a14:useLocalDpi xmlns:a14="http://schemas.microsoft.com/office/drawing/2010/main" val="0"/>
+              </a:ext>
+              <a:ext uri="{96DAC541-7B7A-43D3-8B79-37D633B846F1}">
+                <asvg:svgBlip xmlns:asvg="http://schemas.microsoft.com/office/drawing/2016/SVG/main" r:embed="rId9"/>
+              </a:ext>
+            </a:extLst>
+          </a:blip>
+          <a:stretch>
+            <a:fillRect/>
+          </a:stretch>
+        </p:blipFill>
+        <p:spPr>
+          <a:xfrm>
+            <a:off x="977901" y="3118519"/>
+            <a:ext cx="469900" cy="469900"/>
+          </a:xfrm>
+        </p:spPr>
+      </p:pic>
+      <p:pic>
+        <p:nvPicPr>
+          <p:cNvPr id="6" name="Elemento grafico 5" descr="Monete">
+            <a:extLst>
+              <a:ext uri="{FF2B5EF4-FFF2-40B4-BE49-F238E27FC236}">
+                <a16:creationId xmlns:a16="http://schemas.microsoft.com/office/drawing/2014/main" id="{6D761A88-E484-5200-754C-E0EFEEC00209}"/>
+              </a:ext>
+            </a:extLst>
+          </p:cNvPr>
+          <p:cNvPicPr>
+            <a:picLocks noChangeAspect="1"/>
+          </p:cNvPicPr>
+          <p:nvPr/>
+        </p:nvPicPr>
+        <p:blipFill>
+          <a:blip r:embed="rId10">
+            <a:extLst>
+              <a:ext uri="{28A0092B-C50C-407E-A947-70E740481C1C}">
+                <a14:useLocalDpi xmlns:a14="http://schemas.microsoft.com/office/drawing/2010/main" val="0"/>
+              </a:ext>
+              <a:ext uri="{96DAC541-7B7A-43D3-8B79-37D633B846F1}">
+                <asvg:svgBlip xmlns:asvg="http://schemas.microsoft.com/office/drawing/2016/SVG/main" r:embed="rId11"/>
+              </a:ext>
+            </a:extLst>
+          </a:blip>
+          <a:stretch>
+            <a:fillRect/>
+          </a:stretch>
+        </p:blipFill>
+        <p:spPr>
+          <a:xfrm>
+            <a:off x="977901" y="3726374"/>
+            <a:ext cx="469900" cy="469900"/>
+          </a:xfrm>
+          <a:prstGeom prst="rect">
+            <a:avLst/>
+          </a:prstGeom>
+        </p:spPr>
+      </p:pic>
+      <p:sp>
+        <p:nvSpPr>
+          <p:cNvPr id="9" name="CasellaDiTesto 8">
+            <a:extLst>
+              <a:ext uri="{FF2B5EF4-FFF2-40B4-BE49-F238E27FC236}">
+                <a16:creationId xmlns:a16="http://schemas.microsoft.com/office/drawing/2014/main" id="{A2E1F166-4AA8-DE4D-3E51-E0106A52DA53}"/>
+              </a:ext>
+            </a:extLst>
+          </p:cNvPr>
+          <p:cNvSpPr txBox="1"/>
+          <p:nvPr/>
+        </p:nvSpPr>
+        <p:spPr>
+          <a:xfrm>
+            <a:off x="5792694" y="1828643"/>
+            <a:ext cx="5864412" cy="3519553"/>
+          </a:xfrm>
+          <a:prstGeom prst="rect">
+            <a:avLst/>
+          </a:prstGeom>
+          <a:noFill/>
+        </p:spPr>
+        <p:txBody>
+          <a:bodyPr wrap="square">
+            <a:spAutoFit/>
+          </a:bodyPr>
+          <a:lstStyle/>
+          <a:p>
+            <a:pPr algn="l">
+              <a:lnSpc>
+                <a:spcPct val="250000"/>
+              </a:lnSpc>
+            </a:pPr>
+            <a:r>
+              <a:rPr lang="fr-FR" sz="2000" b="1" i="0" dirty="0">
+                <a:effectLst/>
+                <a:latin typeface="Söhne"/>
+              </a:rPr>
+              <a:t>Limitations</a:t>
+            </a:r>
+            <a:endParaRPr lang="fr-FR" b="1" i="0" dirty="0">
+              <a:effectLst/>
+              <a:latin typeface="Söhne"/>
+            </a:endParaRPr>
           </a:p>
           <a:p>
             <a:pPr marL="285750" indent="-285750" algn="l">
               <a:lnSpc>
-                <a:spcPct val="150000"/>
+                <a:spcPct val="250000"/>
               </a:lnSpc>
               <a:buFont typeface="Arial" panose="020B0604020202020204" pitchFamily="34" charset="0"/>
               <a:buChar char="•"/>
             </a:pPr>
             <a:r>
-              <a:rPr lang="fr-FR" b="1" i="0" dirty="0">
-                <a:effectLst/>
-                <a:latin typeface="Söhne"/>
-              </a:rPr>
-              <a:t>Versatilité</a:t>
-            </a:r>
-            <a:r>
               <a:rPr lang="fr-FR" b="0" i="0" dirty="0">
                 <a:effectLst/>
                 <a:latin typeface="Söhne"/>
               </a:rPr>
-              <a:t>: Adaptable à différents types de chirurgies et de complications.</a:t>
-            </a:r>
-          </a:p>
-          <a:p>
-            <a:pPr marL="285750" indent="-285750" algn="l">
-              <a:lnSpc>
-                <a:spcPct val="150000"/>
-              </a:lnSpc>
-              <a:buFont typeface="Arial" panose="020B0604020202020204" pitchFamily="34" charset="0"/>
-              <a:buChar char="•"/>
-            </a:pPr>
-            <a:r>
-              <a:rPr lang="fr-FR" b="1" i="0" dirty="0">
-                <a:effectLst/>
-                <a:latin typeface="Söhne"/>
-              </a:rPr>
-              <a:t>Économies Financières</a:t>
+              <a:t>terminologie clinique vague </a:t>
             </a:r>
             <a:r>
               <a:rPr lang="fr-FR" b="0" i="0" dirty="0">
                 <a:effectLst/>
                 <a:latin typeface="Söhne"/>
+                <a:sym typeface="Wingdings" panose="05000000000000000000" pitchFamily="2" charset="2"/>
               </a:rPr>
-              <a:t>: Économie financière estimée à €2,090 par infirmier par an.</a:t>
-            </a:r>
-          </a:p>
-          <a:p>
-            <a:pPr algn="l">
-              <a:lnSpc>
-                <a:spcPct val="150000"/>
-              </a:lnSpc>
-            </a:pPr>
-            <a:r>
-              <a:rPr lang="fr-FR" b="1" i="0" dirty="0">
-                <a:effectLst/>
-                <a:latin typeface="Söhne"/>
-              </a:rPr>
-              <a:t>Limitations</a:t>
-            </a:r>
-          </a:p>
-          <a:p>
-            <a:pPr marL="285750" indent="-285750" algn="l">
-              <a:lnSpc>
-                <a:spcPct val="150000"/>
-              </a:lnSpc>
-              <a:buFont typeface="Arial" panose="020B0604020202020204" pitchFamily="34" charset="0"/>
-              <a:buChar char="•"/>
-            </a:pPr>
-            <a:r>
-              <a:rPr lang="fr-FR" b="1" i="0" dirty="0">
-                <a:effectLst/>
-                <a:latin typeface="Söhne"/>
-              </a:rPr>
-              <a:t>Sensibilité</a:t>
-            </a:r>
-            <a:r>
-              <a:rPr lang="fr-FR" dirty="0">
-                <a:latin typeface="Söhne"/>
-              </a:rPr>
-              <a:t> l</a:t>
-            </a:r>
-            <a:r>
-              <a:rPr lang="fr-FR" b="0" i="0" dirty="0">
-                <a:effectLst/>
-                <a:latin typeface="Söhne"/>
-              </a:rPr>
-              <a:t>imitée par une terminologie clinique vague et une documentation incomplète.</a:t>
-            </a:r>
-          </a:p>
-          <a:p>
-            <a:pPr marL="285750" indent="-285750" algn="l">
-              <a:lnSpc>
-                <a:spcPct val="150000"/>
-              </a:lnSpc>
-              <a:buFont typeface="Arial" panose="020B0604020202020204" pitchFamily="34" charset="0"/>
-              <a:buChar char="•"/>
-            </a:pPr>
-            <a:r>
-              <a:rPr lang="fr-FR" b="0" i="0" dirty="0">
-                <a:effectLst/>
-                <a:latin typeface="Söhne"/>
-              </a:rPr>
-              <a:t>Absence d’un</a:t>
-            </a:r>
-            <a:r>
-              <a:rPr lang="fr-FR" b="0" i="1" dirty="0">
-                <a:effectLst/>
-                <a:latin typeface="Söhne"/>
-              </a:rPr>
-              <a:t> </a:t>
-            </a:r>
-            <a:r>
-              <a:rPr lang="fr-FR" b="1" dirty="0">
-                <a:effectLst/>
-                <a:latin typeface="Söhne"/>
-              </a:rPr>
-              <a:t>Gold Standard</a:t>
-            </a:r>
-          </a:p>
-          <a:p>
-            <a:pPr marL="285750" indent="-285750" algn="l">
-              <a:lnSpc>
-                <a:spcPct val="150000"/>
-              </a:lnSpc>
-              <a:buFont typeface="Arial" panose="020B0604020202020204" pitchFamily="34" charset="0"/>
-              <a:buChar char="•"/>
-            </a:pPr>
-            <a:r>
-              <a:rPr lang="fr-FR" dirty="0">
-                <a:latin typeface="Söhne"/>
-              </a:rPr>
-              <a:t>Limité aux données informatisées</a:t>
+              <a:t> impacte sur la sensibilité</a:t>
             </a:r>
             <a:endParaRPr lang="fr-FR" b="0" i="0" dirty="0">
               <a:effectLst/>
@@ -33975,7 +33413,7 @@
           <a:p>
             <a:pPr marL="285750" indent="-285750" algn="l">
               <a:lnSpc>
-                <a:spcPct val="150000"/>
+                <a:spcPct val="250000"/>
               </a:lnSpc>
               <a:buFont typeface="Arial" panose="020B0604020202020204" pitchFamily="34" charset="0"/>
               <a:buChar char="•"/>
@@ -33985,8 +33423,60 @@
                 <a:effectLst/>
                 <a:latin typeface="Söhne"/>
               </a:rPr>
-              <a:t>Ne capture pas les cas de patients qui ne reviennent pas à l'hôpital pour leurs infections.</a:t>
-            </a:r>
+              <a:t>Absence d’un</a:t>
+            </a:r>
+            <a:r>
+              <a:rPr lang="fr-FR" b="0" i="1" dirty="0">
+                <a:effectLst/>
+                <a:latin typeface="Söhne"/>
+              </a:rPr>
+              <a:t> </a:t>
+            </a:r>
+            <a:r>
+              <a:rPr lang="fr-FR" dirty="0">
+                <a:effectLst/>
+                <a:latin typeface="Söhne"/>
+              </a:rPr>
+              <a:t>Gold Standard</a:t>
+            </a:r>
+          </a:p>
+          <a:p>
+            <a:pPr marL="285750" indent="-285750" algn="l">
+              <a:lnSpc>
+                <a:spcPct val="250000"/>
+              </a:lnSpc>
+              <a:buFont typeface="Arial" panose="020B0604020202020204" pitchFamily="34" charset="0"/>
+              <a:buChar char="•"/>
+            </a:pPr>
+            <a:r>
+              <a:rPr lang="fr-FR" dirty="0">
+                <a:latin typeface="Söhne"/>
+              </a:rPr>
+              <a:t>Limité aux données informatisées</a:t>
+            </a:r>
+            <a:endParaRPr lang="fr-FR" b="0" i="0" dirty="0">
+              <a:effectLst/>
+              <a:latin typeface="Söhne"/>
+            </a:endParaRPr>
+          </a:p>
+          <a:p>
+            <a:pPr marL="285750" indent="-285750" algn="l">
+              <a:lnSpc>
+                <a:spcPct val="250000"/>
+              </a:lnSpc>
+              <a:buFont typeface="Arial" panose="020B0604020202020204" pitchFamily="34" charset="0"/>
+              <a:buChar char="•"/>
+            </a:pPr>
+            <a:r>
+              <a:rPr lang="fr-FR" dirty="0">
+                <a:latin typeface="Söhne"/>
+              </a:rPr>
+              <a:t>Absence de lien avec la médecine de ville / autres H</a:t>
+            </a:r>
+            <a:endParaRPr lang="fr-FR" b="0" i="0" dirty="0">
+              <a:effectLst/>
+              <a:latin typeface="Söhne"/>
+            </a:endParaRPr>
           </a:p>
         </p:txBody>
       </p:sp>

</xml_diff>